<commit_message>
finalisation de la présentation
</commit_message>
<xml_diff>
--- a/Présentations/Présentation1.pptx
+++ b/Présentations/Présentation1.pptx
@@ -4,6 +4,9 @@
   <p:sldMasterIdLst>
     <p:sldMasterId id="2147483648" r:id="rId1"/>
   </p:sldMasterIdLst>
+  <p:notesMasterIdLst>
+    <p:notesMasterId r:id="rId18"/>
+  </p:notesMasterIdLst>
   <p:sldIdLst>
     <p:sldId id="256" r:id="rId2"/>
     <p:sldId id="257" r:id="rId3"/>
@@ -16,7 +19,11 @@
     <p:sldId id="264" r:id="rId10"/>
     <p:sldId id="265" r:id="rId11"/>
     <p:sldId id="266" r:id="rId12"/>
-    <p:sldId id="267" r:id="rId13"/>
+    <p:sldId id="268" r:id="rId13"/>
+    <p:sldId id="267" r:id="rId14"/>
+    <p:sldId id="269" r:id="rId15"/>
+    <p:sldId id="270" r:id="rId16"/>
+    <p:sldId id="272" r:id="rId17"/>
   </p:sldIdLst>
   <p:sldSz cx="12192000" cy="6858000"/>
   <p:notesSz cx="6858000" cy="9144000"/>
@@ -115,7 +122,362 @@
       </a:defRPr>
     </a:lvl9pPr>
   </p:defaultTextStyle>
+  <p:extLst>
+    <p:ext uri="{EFAFB233-063F-42B5-8137-9DF3F51BA10A}">
+      <p15:sldGuideLst xmlns:p15="http://schemas.microsoft.com/office/powerpoint/2012/main"/>
+    </p:ext>
+  </p:extLst>
 </p:presentation>
+</file>
+
+<file path=ppt/notesMasters/notesMaster1.xml><?xml version="1.0" encoding="utf-8"?>
+<p:notesMaster xmlns:a="http://schemas.openxmlformats.org/drawingml/2006/main" xmlns:r="http://schemas.openxmlformats.org/officeDocument/2006/relationships" xmlns:p="http://schemas.openxmlformats.org/presentationml/2006/main">
+  <p:cSld>
+    <p:bg>
+      <p:bgRef idx="1001">
+        <a:schemeClr val="bg1"/>
+      </p:bgRef>
+    </p:bg>
+    <p:spTree>
+      <p:nvGrpSpPr>
+        <p:cNvPr id="1" name=""/>
+        <p:cNvGrpSpPr/>
+        <p:nvPr/>
+      </p:nvGrpSpPr>
+      <p:grpSpPr>
+        <a:xfrm>
+          <a:off x="0" y="0"/>
+          <a:ext cx="0" cy="0"/>
+          <a:chOff x="0" y="0"/>
+          <a:chExt cx="0" cy="0"/>
+        </a:xfrm>
+      </p:grpSpPr>
+      <p:sp>
+        <p:nvSpPr>
+          <p:cNvPr id="2" name="Espace réservé de l'en-tête 1"/>
+          <p:cNvSpPr>
+            <a:spLocks noGrp="1"/>
+          </p:cNvSpPr>
+          <p:nvPr>
+            <p:ph type="hdr" sz="quarter"/>
+          </p:nvPr>
+        </p:nvSpPr>
+        <p:spPr>
+          <a:xfrm>
+            <a:off x="0" y="0"/>
+            <a:ext cx="2971800" cy="458788"/>
+          </a:xfrm>
+          <a:prstGeom prst="rect">
+            <a:avLst/>
+          </a:prstGeom>
+        </p:spPr>
+        <p:txBody>
+          <a:bodyPr vert="horz" lIns="91440" tIns="45720" rIns="91440" bIns="45720" rtlCol="0"/>
+          <a:lstStyle>
+            <a:lvl1pPr algn="l">
+              <a:defRPr sz="1200"/>
+            </a:lvl1pPr>
+          </a:lstStyle>
+          <a:p>
+            <a:endParaRPr lang="en-BE"/>
+          </a:p>
+        </p:txBody>
+      </p:sp>
+      <p:sp>
+        <p:nvSpPr>
+          <p:cNvPr id="3" name="Espace réservé de la date 2"/>
+          <p:cNvSpPr>
+            <a:spLocks noGrp="1"/>
+          </p:cNvSpPr>
+          <p:nvPr>
+            <p:ph type="dt" idx="1"/>
+          </p:nvPr>
+        </p:nvSpPr>
+        <p:spPr>
+          <a:xfrm>
+            <a:off x="3884613" y="0"/>
+            <a:ext cx="2971800" cy="458788"/>
+          </a:xfrm>
+          <a:prstGeom prst="rect">
+            <a:avLst/>
+          </a:prstGeom>
+        </p:spPr>
+        <p:txBody>
+          <a:bodyPr vert="horz" lIns="91440" tIns="45720" rIns="91440" bIns="45720" rtlCol="0"/>
+          <a:lstStyle>
+            <a:lvl1pPr algn="r">
+              <a:defRPr sz="1200"/>
+            </a:lvl1pPr>
+          </a:lstStyle>
+          <a:p>
+            <a:fld id="{6A935363-8ABB-4AE3-A462-17F2FB38680F}" type="datetimeFigureOut">
+              <a:rPr lang="en-BE" smtClean="0"/>
+              <a:t>24/10/2022</a:t>
+            </a:fld>
+            <a:endParaRPr lang="en-BE"/>
+          </a:p>
+        </p:txBody>
+      </p:sp>
+      <p:sp>
+        <p:nvSpPr>
+          <p:cNvPr id="4" name="Espace réservé de l'image des diapositives 3"/>
+          <p:cNvSpPr>
+            <a:spLocks noGrp="1" noRot="1" noChangeAspect="1"/>
+          </p:cNvSpPr>
+          <p:nvPr>
+            <p:ph type="sldImg" idx="2"/>
+          </p:nvPr>
+        </p:nvSpPr>
+        <p:spPr>
+          <a:xfrm>
+            <a:off x="685800" y="1143000"/>
+            <a:ext cx="5486400" cy="3086100"/>
+          </a:xfrm>
+          <a:prstGeom prst="rect">
+            <a:avLst/>
+          </a:prstGeom>
+          <a:noFill/>
+          <a:ln w="12700">
+            <a:solidFill>
+              <a:prstClr val="black"/>
+            </a:solidFill>
+          </a:ln>
+        </p:spPr>
+        <p:txBody>
+          <a:bodyPr vert="horz" lIns="91440" tIns="45720" rIns="91440" bIns="45720" rtlCol="0" anchor="ctr"/>
+          <a:lstStyle/>
+          <a:p>
+            <a:endParaRPr lang="en-BE"/>
+          </a:p>
+        </p:txBody>
+      </p:sp>
+      <p:sp>
+        <p:nvSpPr>
+          <p:cNvPr id="5" name="Espace réservé des notes 4"/>
+          <p:cNvSpPr>
+            <a:spLocks noGrp="1"/>
+          </p:cNvSpPr>
+          <p:nvPr>
+            <p:ph type="body" sz="quarter" idx="3"/>
+          </p:nvPr>
+        </p:nvSpPr>
+        <p:spPr>
+          <a:xfrm>
+            <a:off x="685800" y="4400550"/>
+            <a:ext cx="5486400" cy="3600450"/>
+          </a:xfrm>
+          <a:prstGeom prst="rect">
+            <a:avLst/>
+          </a:prstGeom>
+        </p:spPr>
+        <p:txBody>
+          <a:bodyPr vert="horz" lIns="91440" tIns="45720" rIns="91440" bIns="45720" rtlCol="0"/>
+          <a:lstStyle/>
+          <a:p>
+            <a:pPr lvl="0"/>
+            <a:r>
+              <a:rPr lang="fr-FR"/>
+              <a:t>Cliquez pour modifier les styles du texte du masque</a:t>
+            </a:r>
+          </a:p>
+          <a:p>
+            <a:pPr lvl="1"/>
+            <a:r>
+              <a:rPr lang="fr-FR"/>
+              <a:t>Deuxième niveau</a:t>
+            </a:r>
+          </a:p>
+          <a:p>
+            <a:pPr lvl="2"/>
+            <a:r>
+              <a:rPr lang="fr-FR"/>
+              <a:t>Troisième niveau</a:t>
+            </a:r>
+          </a:p>
+          <a:p>
+            <a:pPr lvl="3"/>
+            <a:r>
+              <a:rPr lang="fr-FR"/>
+              <a:t>Quatrième niveau</a:t>
+            </a:r>
+          </a:p>
+          <a:p>
+            <a:pPr lvl="4"/>
+            <a:r>
+              <a:rPr lang="fr-FR"/>
+              <a:t>Cinquième niveau</a:t>
+            </a:r>
+            <a:endParaRPr lang="en-BE"/>
+          </a:p>
+        </p:txBody>
+      </p:sp>
+      <p:sp>
+        <p:nvSpPr>
+          <p:cNvPr id="6" name="Espace réservé du pied de page 5"/>
+          <p:cNvSpPr>
+            <a:spLocks noGrp="1"/>
+          </p:cNvSpPr>
+          <p:nvPr>
+            <p:ph type="ftr" sz="quarter" idx="4"/>
+          </p:nvPr>
+        </p:nvSpPr>
+        <p:spPr>
+          <a:xfrm>
+            <a:off x="0" y="8685213"/>
+            <a:ext cx="2971800" cy="458787"/>
+          </a:xfrm>
+          <a:prstGeom prst="rect">
+            <a:avLst/>
+          </a:prstGeom>
+        </p:spPr>
+        <p:txBody>
+          <a:bodyPr vert="horz" lIns="91440" tIns="45720" rIns="91440" bIns="45720" rtlCol="0" anchor="b"/>
+          <a:lstStyle>
+            <a:lvl1pPr algn="l">
+              <a:defRPr sz="1200"/>
+            </a:lvl1pPr>
+          </a:lstStyle>
+          <a:p>
+            <a:endParaRPr lang="en-BE"/>
+          </a:p>
+        </p:txBody>
+      </p:sp>
+      <p:sp>
+        <p:nvSpPr>
+          <p:cNvPr id="7" name="Espace réservé du numéro de diapositive 6"/>
+          <p:cNvSpPr>
+            <a:spLocks noGrp="1"/>
+          </p:cNvSpPr>
+          <p:nvPr>
+            <p:ph type="sldNum" sz="quarter" idx="5"/>
+          </p:nvPr>
+        </p:nvSpPr>
+        <p:spPr>
+          <a:xfrm>
+            <a:off x="3884613" y="8685213"/>
+            <a:ext cx="2971800" cy="458787"/>
+          </a:xfrm>
+          <a:prstGeom prst="rect">
+            <a:avLst/>
+          </a:prstGeom>
+        </p:spPr>
+        <p:txBody>
+          <a:bodyPr vert="horz" lIns="91440" tIns="45720" rIns="91440" bIns="45720" rtlCol="0" anchor="b"/>
+          <a:lstStyle>
+            <a:lvl1pPr algn="r">
+              <a:defRPr sz="1200"/>
+            </a:lvl1pPr>
+          </a:lstStyle>
+          <a:p>
+            <a:fld id="{85181477-B541-42E0-9502-19FD2516093E}" type="slidenum">
+              <a:rPr lang="en-BE" smtClean="0"/>
+              <a:t>‹N°›</a:t>
+            </a:fld>
+            <a:endParaRPr lang="en-BE"/>
+          </a:p>
+        </p:txBody>
+      </p:sp>
+    </p:spTree>
+    <p:extLst>
+      <p:ext uri="{BB962C8B-B14F-4D97-AF65-F5344CB8AC3E}">
+        <p14:creationId xmlns:p14="http://schemas.microsoft.com/office/powerpoint/2010/main" val="2148444962"/>
+      </p:ext>
+    </p:extLst>
+  </p:cSld>
+  <p:clrMap bg1="lt1" tx1="dk1" bg2="lt2" tx2="dk2" accent1="accent1" accent2="accent2" accent3="accent3" accent4="accent4" accent5="accent5" accent6="accent6" hlink="hlink" folHlink="folHlink"/>
+  <p:notesStyle>
+    <a:lvl1pPr marL="0" algn="l" defTabSz="914400" rtl="0" eaLnBrk="1" latinLnBrk="0" hangingPunct="1">
+      <a:defRPr sz="1200" kern="1200">
+        <a:solidFill>
+          <a:schemeClr val="tx1"/>
+        </a:solidFill>
+        <a:latin typeface="+mn-lt"/>
+        <a:ea typeface="+mn-ea"/>
+        <a:cs typeface="+mn-cs"/>
+      </a:defRPr>
+    </a:lvl1pPr>
+    <a:lvl2pPr marL="457200" algn="l" defTabSz="914400" rtl="0" eaLnBrk="1" latinLnBrk="0" hangingPunct="1">
+      <a:defRPr sz="1200" kern="1200">
+        <a:solidFill>
+          <a:schemeClr val="tx1"/>
+        </a:solidFill>
+        <a:latin typeface="+mn-lt"/>
+        <a:ea typeface="+mn-ea"/>
+        <a:cs typeface="+mn-cs"/>
+      </a:defRPr>
+    </a:lvl2pPr>
+    <a:lvl3pPr marL="914400" algn="l" defTabSz="914400" rtl="0" eaLnBrk="1" latinLnBrk="0" hangingPunct="1">
+      <a:defRPr sz="1200" kern="1200">
+        <a:solidFill>
+          <a:schemeClr val="tx1"/>
+        </a:solidFill>
+        <a:latin typeface="+mn-lt"/>
+        <a:ea typeface="+mn-ea"/>
+        <a:cs typeface="+mn-cs"/>
+      </a:defRPr>
+    </a:lvl3pPr>
+    <a:lvl4pPr marL="1371600" algn="l" defTabSz="914400" rtl="0" eaLnBrk="1" latinLnBrk="0" hangingPunct="1">
+      <a:defRPr sz="1200" kern="1200">
+        <a:solidFill>
+          <a:schemeClr val="tx1"/>
+        </a:solidFill>
+        <a:latin typeface="+mn-lt"/>
+        <a:ea typeface="+mn-ea"/>
+        <a:cs typeface="+mn-cs"/>
+      </a:defRPr>
+    </a:lvl4pPr>
+    <a:lvl5pPr marL="1828800" algn="l" defTabSz="914400" rtl="0" eaLnBrk="1" latinLnBrk="0" hangingPunct="1">
+      <a:defRPr sz="1200" kern="1200">
+        <a:solidFill>
+          <a:schemeClr val="tx1"/>
+        </a:solidFill>
+        <a:latin typeface="+mn-lt"/>
+        <a:ea typeface="+mn-ea"/>
+        <a:cs typeface="+mn-cs"/>
+      </a:defRPr>
+    </a:lvl5pPr>
+    <a:lvl6pPr marL="2286000" algn="l" defTabSz="914400" rtl="0" eaLnBrk="1" latinLnBrk="0" hangingPunct="1">
+      <a:defRPr sz="1200" kern="1200">
+        <a:solidFill>
+          <a:schemeClr val="tx1"/>
+        </a:solidFill>
+        <a:latin typeface="+mn-lt"/>
+        <a:ea typeface="+mn-ea"/>
+        <a:cs typeface="+mn-cs"/>
+      </a:defRPr>
+    </a:lvl6pPr>
+    <a:lvl7pPr marL="2743200" algn="l" defTabSz="914400" rtl="0" eaLnBrk="1" latinLnBrk="0" hangingPunct="1">
+      <a:defRPr sz="1200" kern="1200">
+        <a:solidFill>
+          <a:schemeClr val="tx1"/>
+        </a:solidFill>
+        <a:latin typeface="+mn-lt"/>
+        <a:ea typeface="+mn-ea"/>
+        <a:cs typeface="+mn-cs"/>
+      </a:defRPr>
+    </a:lvl7pPr>
+    <a:lvl8pPr marL="3200400" algn="l" defTabSz="914400" rtl="0" eaLnBrk="1" latinLnBrk="0" hangingPunct="1">
+      <a:defRPr sz="1200" kern="1200">
+        <a:solidFill>
+          <a:schemeClr val="tx1"/>
+        </a:solidFill>
+        <a:latin typeface="+mn-lt"/>
+        <a:ea typeface="+mn-ea"/>
+        <a:cs typeface="+mn-cs"/>
+      </a:defRPr>
+    </a:lvl8pPr>
+    <a:lvl9pPr marL="3657600" algn="l" defTabSz="914400" rtl="0" eaLnBrk="1" latinLnBrk="0" hangingPunct="1">
+      <a:defRPr sz="1200" kern="1200">
+        <a:solidFill>
+          <a:schemeClr val="tx1"/>
+        </a:solidFill>
+        <a:latin typeface="+mn-lt"/>
+        <a:ea typeface="+mn-ea"/>
+        <a:cs typeface="+mn-cs"/>
+      </a:defRPr>
+    </a:lvl9pPr>
+  </p:notesStyle>
+</p:notesMaster>
 </file>
 
 <file path=ppt/slideLayouts/slideLayout1.xml><?xml version="1.0" encoding="utf-8"?>
@@ -265,9 +627,9 @@
           <a:bodyPr/>
           <a:lstStyle/>
           <a:p>
-            <a:fld id="{6C53437F-8857-4E92-ABE1-D6151D9476C2}" type="datetimeFigureOut">
+            <a:fld id="{DC2DE504-2637-479A-91D0-74DA9F9867BA}" type="datetime1">
               <a:rPr lang="fr-BE" smtClean="0"/>
-              <a:t>23-10-22</a:t>
+              <a:t>24-10-22</a:t>
             </a:fld>
             <a:endParaRPr lang="fr-BE"/>
           </a:p>
@@ -465,9 +827,9 @@
           <a:bodyPr/>
           <a:lstStyle/>
           <a:p>
-            <a:fld id="{6C53437F-8857-4E92-ABE1-D6151D9476C2}" type="datetimeFigureOut">
+            <a:fld id="{4FD267E7-E721-4DAE-A820-86D1994C8D8D}" type="datetime1">
               <a:rPr lang="fr-BE" smtClean="0"/>
-              <a:t>23-10-22</a:t>
+              <a:t>24-10-22</a:t>
             </a:fld>
             <a:endParaRPr lang="fr-BE"/>
           </a:p>
@@ -675,9 +1037,9 @@
           <a:bodyPr/>
           <a:lstStyle/>
           <a:p>
-            <a:fld id="{6C53437F-8857-4E92-ABE1-D6151D9476C2}" type="datetimeFigureOut">
+            <a:fld id="{DCA5B7F3-1C4B-41B4-9BBE-CFF8D1257DDC}" type="datetime1">
               <a:rPr lang="fr-BE" smtClean="0"/>
-              <a:t>23-10-22</a:t>
+              <a:t>24-10-22</a:t>
             </a:fld>
             <a:endParaRPr lang="fr-BE"/>
           </a:p>
@@ -875,9 +1237,9 @@
           <a:bodyPr/>
           <a:lstStyle/>
           <a:p>
-            <a:fld id="{6C53437F-8857-4E92-ABE1-D6151D9476C2}" type="datetimeFigureOut">
+            <a:fld id="{903F49D6-C45C-479D-82F8-290224782B87}" type="datetime1">
               <a:rPr lang="fr-BE" smtClean="0"/>
-              <a:t>23-10-22</a:t>
+              <a:t>24-10-22</a:t>
             </a:fld>
             <a:endParaRPr lang="fr-BE"/>
           </a:p>
@@ -1151,9 +1513,9 @@
           <a:bodyPr/>
           <a:lstStyle/>
           <a:p>
-            <a:fld id="{6C53437F-8857-4E92-ABE1-D6151D9476C2}" type="datetimeFigureOut">
+            <a:fld id="{3A67B76A-9F42-433C-88F5-E78A247E28A4}" type="datetime1">
               <a:rPr lang="fr-BE" smtClean="0"/>
-              <a:t>23-10-22</a:t>
+              <a:t>24-10-22</a:t>
             </a:fld>
             <a:endParaRPr lang="fr-BE"/>
           </a:p>
@@ -1419,9 +1781,9 @@
           <a:bodyPr/>
           <a:lstStyle/>
           <a:p>
-            <a:fld id="{6C53437F-8857-4E92-ABE1-D6151D9476C2}" type="datetimeFigureOut">
+            <a:fld id="{EF05CF65-2359-43A2-BACF-C8E393F8A144}" type="datetime1">
               <a:rPr lang="fr-BE" smtClean="0"/>
-              <a:t>23-10-22</a:t>
+              <a:t>24-10-22</a:t>
             </a:fld>
             <a:endParaRPr lang="fr-BE"/>
           </a:p>
@@ -1834,9 +2196,9 @@
           <a:bodyPr/>
           <a:lstStyle/>
           <a:p>
-            <a:fld id="{6C53437F-8857-4E92-ABE1-D6151D9476C2}" type="datetimeFigureOut">
+            <a:fld id="{468042C8-BC09-48E1-8236-43ADF4FE72F2}" type="datetime1">
               <a:rPr lang="fr-BE" smtClean="0"/>
-              <a:t>23-10-22</a:t>
+              <a:t>24-10-22</a:t>
             </a:fld>
             <a:endParaRPr lang="fr-BE"/>
           </a:p>
@@ -1976,9 +2338,9 @@
           <a:bodyPr/>
           <a:lstStyle/>
           <a:p>
-            <a:fld id="{6C53437F-8857-4E92-ABE1-D6151D9476C2}" type="datetimeFigureOut">
+            <a:fld id="{03F4CA56-94D7-4473-8957-0DB2EFF383D3}" type="datetime1">
               <a:rPr lang="fr-BE" smtClean="0"/>
-              <a:t>23-10-22</a:t>
+              <a:t>24-10-22</a:t>
             </a:fld>
             <a:endParaRPr lang="fr-BE"/>
           </a:p>
@@ -2089,9 +2451,9 @@
           <a:bodyPr/>
           <a:lstStyle/>
           <a:p>
-            <a:fld id="{6C53437F-8857-4E92-ABE1-D6151D9476C2}" type="datetimeFigureOut">
+            <a:fld id="{C6A637C5-2638-4FE7-9147-0DBB76C4CD95}" type="datetime1">
               <a:rPr lang="fr-BE" smtClean="0"/>
-              <a:t>23-10-22</a:t>
+              <a:t>24-10-22</a:t>
             </a:fld>
             <a:endParaRPr lang="fr-BE"/>
           </a:p>
@@ -2402,9 +2764,9 @@
           <a:bodyPr/>
           <a:lstStyle/>
           <a:p>
-            <a:fld id="{6C53437F-8857-4E92-ABE1-D6151D9476C2}" type="datetimeFigureOut">
+            <a:fld id="{D1850EC5-065F-449E-A21B-AC4D0F712E50}" type="datetime1">
               <a:rPr lang="fr-BE" smtClean="0"/>
-              <a:t>23-10-22</a:t>
+              <a:t>24-10-22</a:t>
             </a:fld>
             <a:endParaRPr lang="fr-BE"/>
           </a:p>
@@ -2691,9 +3053,9 @@
           <a:bodyPr/>
           <a:lstStyle/>
           <a:p>
-            <a:fld id="{6C53437F-8857-4E92-ABE1-D6151D9476C2}" type="datetimeFigureOut">
+            <a:fld id="{EC60967A-FB67-4B8C-9D17-C74620C51DD0}" type="datetime1">
               <a:rPr lang="fr-BE" smtClean="0"/>
-              <a:t>23-10-22</a:t>
+              <a:t>24-10-22</a:t>
             </a:fld>
             <a:endParaRPr lang="fr-BE"/>
           </a:p>
@@ -2934,9 +3296,9 @@
             </a:lvl1pPr>
           </a:lstStyle>
           <a:p>
-            <a:fld id="{6C53437F-8857-4E92-ABE1-D6151D9476C2}" type="datetimeFigureOut">
+            <a:fld id="{AF8A8559-A363-4CCC-A508-120DA62B166C}" type="datetime1">
               <a:rPr lang="fr-BE" smtClean="0"/>
-              <a:t>23-10-22</a:t>
+              <a:t>24-10-22</a:t>
             </a:fld>
             <a:endParaRPr lang="fr-BE"/>
           </a:p>
@@ -3053,6 +3415,7 @@
     <p:sldLayoutId id="2147483658" r:id="rId10"/>
     <p:sldLayoutId id="2147483659" r:id="rId11"/>
   </p:sldLayoutIdLst>
+  <p:hf sldNum="0" hdr="0" ftr="0" dt="0"/>
   <p:txStyles>
     <p:titleStyle>
       <a:lvl1pPr algn="l" defTabSz="914400" rtl="0" eaLnBrk="1" latinLnBrk="0" hangingPunct="1">
@@ -3749,6 +4112,39 @@
           </a:prstGeom>
         </p:spPr>
       </p:pic>
+      <p:sp>
+        <p:nvSpPr>
+          <p:cNvPr id="7" name="Espace réservé du numéro de diapositive 6">
+            <a:extLst>
+              <a:ext uri="{FF2B5EF4-FFF2-40B4-BE49-F238E27FC236}">
+                <a16:creationId xmlns:a16="http://schemas.microsoft.com/office/drawing/2014/main" id="{B42E12DC-A8AE-AF17-58F7-39AE5B2447B6}"/>
+              </a:ext>
+            </a:extLst>
+          </p:cNvPr>
+          <p:cNvSpPr>
+            <a:spLocks noGrp="1"/>
+          </p:cNvSpPr>
+          <p:nvPr>
+            <p:ph type="sldNum" sz="quarter" idx="12"/>
+          </p:nvPr>
+        </p:nvSpPr>
+        <p:spPr/>
+        <p:txBody>
+          <a:bodyPr/>
+          <a:lstStyle/>
+          <a:p>
+            <a:fld id="{187BEF47-448A-4600-B2F3-29BC55E386D0}" type="slidenum">
+              <a:rPr lang="fr-BE" sz="2000" smtClean="0">
+                <a:latin typeface="Bahnschrift" panose="020B0502040204020203" pitchFamily="34" charset="0"/>
+              </a:rPr>
+              <a:t>1</a:t>
+            </a:fld>
+            <a:endParaRPr lang="fr-BE" sz="2000" dirty="0">
+              <a:latin typeface="Bahnschrift" panose="020B0502040204020203" pitchFamily="34" charset="0"/>
+            </a:endParaRPr>
+          </a:p>
+        </p:txBody>
+      </p:sp>
     </p:spTree>
     <p:extLst>
       <p:ext uri="{BB962C8B-B14F-4D97-AF65-F5344CB8AC3E}">
@@ -3853,20 +4249,46 @@
               <a:rPr lang="fr-BE" sz="2400" dirty="0">
                 <a:latin typeface="Bahnschrift" panose="020B0502040204020203" pitchFamily="34" charset="0"/>
               </a:rPr>
-              <a:t>Implications </a:t>
-            </a:r>
-            <a:r>
-              <a:rPr lang="fr-BE" sz="2400" dirty="0" err="1">
-                <a:latin typeface="Bahnschrift" panose="020B0502040204020203" pitchFamily="34" charset="0"/>
-              </a:rPr>
-              <a:t>quant-aux</a:t>
-            </a:r>
-            <a:r>
-              <a:rPr lang="fr-BE" sz="2400" dirty="0">
-                <a:latin typeface="Bahnschrift" panose="020B0502040204020203" pitchFamily="34" charset="0"/>
-              </a:rPr>
-              <a:t> données récoltées ?</a:t>
-            </a:r>
+              <a:t>Implications quant aux données récoltées ?</a:t>
+            </a:r>
+          </a:p>
+        </p:txBody>
+      </p:sp>
+      <p:sp>
+        <p:nvSpPr>
+          <p:cNvPr id="4" name="Espace réservé du numéro de diapositive 6">
+            <a:extLst>
+              <a:ext uri="{FF2B5EF4-FFF2-40B4-BE49-F238E27FC236}">
+                <a16:creationId xmlns:a16="http://schemas.microsoft.com/office/drawing/2014/main" id="{774086C1-713C-D22F-DF60-BE8AED5B5AE8}"/>
+              </a:ext>
+            </a:extLst>
+          </p:cNvPr>
+          <p:cNvSpPr>
+            <a:spLocks noGrp="1"/>
+          </p:cNvSpPr>
+          <p:nvPr>
+            <p:ph type="sldNum" sz="quarter" idx="12"/>
+          </p:nvPr>
+        </p:nvSpPr>
+        <p:spPr>
+          <a:xfrm>
+            <a:off x="8610600" y="6356350"/>
+            <a:ext cx="2743200" cy="365125"/>
+          </a:xfrm>
+        </p:spPr>
+        <p:txBody>
+          <a:bodyPr/>
+          <a:lstStyle/>
+          <a:p>
+            <a:fld id="{187BEF47-448A-4600-B2F3-29BC55E386D0}" type="slidenum">
+              <a:rPr lang="fr-BE" sz="2000" smtClean="0">
+                <a:latin typeface="Bahnschrift" panose="020B0502040204020203" pitchFamily="34" charset="0"/>
+              </a:rPr>
+              <a:t>10</a:t>
+            </a:fld>
+            <a:endParaRPr lang="fr-BE" sz="2000" dirty="0">
+              <a:latin typeface="Bahnschrift" panose="020B0502040204020203" pitchFamily="34" charset="0"/>
+            </a:endParaRPr>
           </a:p>
         </p:txBody>
       </p:sp>
@@ -4208,6 +4630,44 @@
           </a:p>
         </p:txBody>
       </p:sp>
+      <p:sp>
+        <p:nvSpPr>
+          <p:cNvPr id="8" name="Espace réservé du numéro de diapositive 6">
+            <a:extLst>
+              <a:ext uri="{FF2B5EF4-FFF2-40B4-BE49-F238E27FC236}">
+                <a16:creationId xmlns:a16="http://schemas.microsoft.com/office/drawing/2014/main" id="{002341F8-2B1C-1538-FDB5-0A1ADD62D006}"/>
+              </a:ext>
+            </a:extLst>
+          </p:cNvPr>
+          <p:cNvSpPr>
+            <a:spLocks noGrp="1"/>
+          </p:cNvSpPr>
+          <p:nvPr>
+            <p:ph type="sldNum" sz="quarter" idx="12"/>
+          </p:nvPr>
+        </p:nvSpPr>
+        <p:spPr>
+          <a:xfrm>
+            <a:off x="8610600" y="6356350"/>
+            <a:ext cx="2743200" cy="365125"/>
+          </a:xfrm>
+        </p:spPr>
+        <p:txBody>
+          <a:bodyPr/>
+          <a:lstStyle/>
+          <a:p>
+            <a:fld id="{187BEF47-448A-4600-B2F3-29BC55E386D0}" type="slidenum">
+              <a:rPr lang="fr-BE" sz="2000" smtClean="0">
+                <a:latin typeface="Bahnschrift" panose="020B0502040204020203" pitchFamily="34" charset="0"/>
+              </a:rPr>
+              <a:t>11</a:t>
+            </a:fld>
+            <a:endParaRPr lang="fr-BE" sz="2000" dirty="0">
+              <a:latin typeface="Bahnschrift" panose="020B0502040204020203" pitchFamily="34" charset="0"/>
+            </a:endParaRPr>
+          </a:p>
+        </p:txBody>
+      </p:sp>
     </p:spTree>
     <p:extLst>
       <p:ext uri="{BB962C8B-B14F-4D97-AF65-F5344CB8AC3E}">
@@ -4270,7 +4730,7 @@
               <a:rPr lang="fr-BE" sz="4400" dirty="0">
                 <a:latin typeface="Bahnschrift" panose="020B0502040204020203" pitchFamily="34" charset="0"/>
               </a:rPr>
-              <a:t>AVC : Gains théoriques</a:t>
+              <a:t>AVC : Ressources exploitées</a:t>
             </a:r>
             <a:endParaRPr lang="fr-BE" dirty="0"/>
           </a:p>
@@ -4278,10 +4738,10 @@
       </p:sp>
       <p:sp>
         <p:nvSpPr>
-          <p:cNvPr id="5" name="ZoneTexte 4">
-            <a:extLst>
-              <a:ext uri="{FF2B5EF4-FFF2-40B4-BE49-F238E27FC236}">
-                <a16:creationId xmlns:a16="http://schemas.microsoft.com/office/drawing/2014/main" id="{497AB441-149B-8ADA-9472-E9239B51F701}"/>
+          <p:cNvPr id="6" name="ZoneTexte 5">
+            <a:extLst>
+              <a:ext uri="{FF2B5EF4-FFF2-40B4-BE49-F238E27FC236}">
+                <a16:creationId xmlns:a16="http://schemas.microsoft.com/office/drawing/2014/main" id="{60367373-6CB6-A9F9-F21B-07252816E57A}"/>
               </a:ext>
             </a:extLst>
           </p:cNvPr>
@@ -4290,8 +4750,8 @@
         </p:nvSpPr>
         <p:spPr>
           <a:xfrm>
-            <a:off x="1809750" y="2005013"/>
-            <a:ext cx="9725025" cy="461665"/>
+            <a:off x="1854840" y="1975296"/>
+            <a:ext cx="9725025" cy="1938992"/>
           </a:xfrm>
           <a:prstGeom prst="rect">
             <a:avLst/>
@@ -4309,20 +4769,540 @@
               <a:buChar char="•"/>
             </a:pPr>
             <a:r>
+              <a:rPr lang="fr-BE" sz="2400" b="0" u="none" strike="noStrike" baseline="0" dirty="0" err="1">
+                <a:solidFill>
+                  <a:srgbClr val="000000"/>
+                </a:solidFill>
+                <a:latin typeface="Bahnschrift" panose="020B0502040204020203" pitchFamily="34" charset="0"/>
+              </a:rPr>
+              <a:t>J.Song</a:t>
+            </a:r>
+            <a:r>
+              <a:rPr lang="fr-BE" sz="2400" b="0" u="none" strike="noStrike" baseline="0" dirty="0">
+                <a:solidFill>
+                  <a:srgbClr val="000000"/>
+                </a:solidFill>
+                <a:latin typeface="Bahnschrift" panose="020B0502040204020203" pitchFamily="34" charset="0"/>
+              </a:rPr>
+              <a:t>, </a:t>
+            </a:r>
+            <a:r>
+              <a:rPr lang="fr-BE" sz="2400" b="0" u="none" strike="noStrike" baseline="0" dirty="0" err="1">
+                <a:solidFill>
+                  <a:srgbClr val="000000"/>
+                </a:solidFill>
+                <a:latin typeface="Bahnschrift" panose="020B0502040204020203" pitchFamily="34" charset="0"/>
+              </a:rPr>
+              <a:t>V.A.Nair</a:t>
+            </a:r>
+            <a:r>
+              <a:rPr lang="fr-BE" sz="2400" b="0" u="none" strike="noStrike" baseline="0" dirty="0">
+                <a:solidFill>
+                  <a:srgbClr val="000000"/>
+                </a:solidFill>
+                <a:latin typeface="Bahnschrift" panose="020B0502040204020203" pitchFamily="34" charset="0"/>
+              </a:rPr>
+              <a:t>, </a:t>
+            </a:r>
+            <a:r>
+              <a:rPr lang="fr-BE" sz="2400" b="0" u="none" strike="noStrike" baseline="0" dirty="0" err="1">
+                <a:solidFill>
+                  <a:srgbClr val="000000"/>
+                </a:solidFill>
+                <a:latin typeface="Bahnschrift" panose="020B0502040204020203" pitchFamily="34" charset="0"/>
+              </a:rPr>
+              <a:t>B.M.Young</a:t>
+            </a:r>
+            <a:r>
+              <a:rPr lang="fr-BE" sz="2400" b="0" u="none" strike="noStrike" baseline="0" dirty="0">
+                <a:solidFill>
+                  <a:srgbClr val="000000"/>
+                </a:solidFill>
+                <a:latin typeface="Bahnschrift" panose="020B0502040204020203" pitchFamily="34" charset="0"/>
+              </a:rPr>
+              <a:t>, </a:t>
+            </a:r>
+            <a:r>
+              <a:rPr lang="fr-BE" sz="2400" b="0" u="none" strike="noStrike" baseline="0" dirty="0" err="1">
+                <a:solidFill>
+                  <a:srgbClr val="000000"/>
+                </a:solidFill>
+                <a:latin typeface="Bahnschrift" panose="020B0502040204020203" pitchFamily="34" charset="0"/>
+              </a:rPr>
+              <a:t>L.M.Walton</a:t>
+            </a:r>
+            <a:r>
+              <a:rPr lang="fr-BE" sz="2400" b="0" u="none" strike="noStrike" baseline="0" dirty="0">
+                <a:solidFill>
+                  <a:srgbClr val="000000"/>
+                </a:solidFill>
+                <a:latin typeface="Bahnschrift" panose="020B0502040204020203" pitchFamily="34" charset="0"/>
+              </a:rPr>
+              <a:t>, </a:t>
+            </a:r>
+            <a:r>
+              <a:rPr lang="fr-BE" sz="2400" b="0" u="none" strike="noStrike" baseline="0" dirty="0" err="1">
+                <a:solidFill>
+                  <a:srgbClr val="000000"/>
+                </a:solidFill>
+                <a:latin typeface="Bahnschrift" panose="020B0502040204020203" pitchFamily="34" charset="0"/>
+              </a:rPr>
+              <a:t>Z.Nigogosyan</a:t>
+            </a:r>
+            <a:r>
+              <a:rPr lang="fr-BE" sz="2400" b="0" u="none" strike="noStrike" baseline="0" dirty="0">
+                <a:solidFill>
+                  <a:srgbClr val="000000"/>
+                </a:solidFill>
+                <a:latin typeface="Bahnschrift" panose="020B0502040204020203" pitchFamily="34" charset="0"/>
+              </a:rPr>
+              <a:t>, </a:t>
+            </a:r>
+            <a:r>
+              <a:rPr lang="fr-BE" sz="2400" b="0" u="none" strike="noStrike" baseline="0" dirty="0" err="1">
+                <a:solidFill>
+                  <a:srgbClr val="000000"/>
+                </a:solidFill>
+                <a:latin typeface="Bahnschrift" panose="020B0502040204020203" pitchFamily="34" charset="0"/>
+              </a:rPr>
+              <a:t>A.Remsik</a:t>
+            </a:r>
+            <a:r>
+              <a:rPr lang="fr-BE" sz="2400" b="0" u="none" strike="noStrike" baseline="0" dirty="0">
+                <a:solidFill>
+                  <a:srgbClr val="000000"/>
+                </a:solidFill>
+                <a:latin typeface="Bahnschrift" panose="020B0502040204020203" pitchFamily="34" charset="0"/>
+              </a:rPr>
+              <a:t>, </a:t>
+            </a:r>
+            <a:r>
+              <a:rPr lang="fr-BE" sz="2400" b="0" u="none" strike="noStrike" baseline="0" dirty="0" err="1">
+                <a:solidFill>
+                  <a:srgbClr val="000000"/>
+                </a:solidFill>
+                <a:latin typeface="Bahnschrift" panose="020B0502040204020203" pitchFamily="34" charset="0"/>
+              </a:rPr>
+              <a:t>M.E.Tyler</a:t>
+            </a:r>
+            <a:r>
+              <a:rPr lang="fr-BE" sz="2400" b="0" u="none" strike="noStrike" baseline="0" dirty="0">
+                <a:solidFill>
+                  <a:srgbClr val="000000"/>
+                </a:solidFill>
+                <a:latin typeface="Bahnschrift" panose="020B0502040204020203" pitchFamily="34" charset="0"/>
+              </a:rPr>
+              <a:t>, </a:t>
+            </a:r>
+            <a:r>
+              <a:rPr lang="fr-BE" sz="2400" b="0" u="none" strike="noStrike" baseline="0" dirty="0" err="1">
+                <a:solidFill>
+                  <a:srgbClr val="000000"/>
+                </a:solidFill>
+                <a:latin typeface="Bahnschrift" panose="020B0502040204020203" pitchFamily="34" charset="0"/>
+              </a:rPr>
+              <a:t>D.Farrar-Edwards</a:t>
+            </a:r>
+            <a:r>
+              <a:rPr lang="fr-BE" sz="2400" b="0" u="none" strike="noStrike" baseline="0" dirty="0">
+                <a:solidFill>
+                  <a:srgbClr val="000000"/>
+                </a:solidFill>
+                <a:latin typeface="Bahnschrift" panose="020B0502040204020203" pitchFamily="34" charset="0"/>
+              </a:rPr>
+              <a:t>, </a:t>
+            </a:r>
+            <a:r>
+              <a:rPr lang="fr-BE" sz="2400" b="0" u="none" strike="noStrike" baseline="0" dirty="0" err="1">
+                <a:solidFill>
+                  <a:srgbClr val="000000"/>
+                </a:solidFill>
+                <a:latin typeface="Bahnschrift" panose="020B0502040204020203" pitchFamily="34" charset="0"/>
+              </a:rPr>
+              <a:t>K.E.Caldera</a:t>
+            </a:r>
+            <a:r>
+              <a:rPr lang="fr-BE" sz="2400" b="0" u="none" strike="noStrike" baseline="0" dirty="0">
+                <a:solidFill>
+                  <a:srgbClr val="000000"/>
+                </a:solidFill>
+                <a:latin typeface="Bahnschrift" panose="020B0502040204020203" pitchFamily="34" charset="0"/>
+              </a:rPr>
+              <a:t>, </a:t>
+            </a:r>
+            <a:r>
+              <a:rPr lang="fr-BE" sz="2400" b="0" u="none" strike="noStrike" baseline="0" dirty="0" err="1">
+                <a:solidFill>
+                  <a:srgbClr val="000000"/>
+                </a:solidFill>
+                <a:latin typeface="Bahnschrift" panose="020B0502040204020203" pitchFamily="34" charset="0"/>
+              </a:rPr>
+              <a:t>J.A.Sattin</a:t>
+            </a:r>
+            <a:r>
+              <a:rPr lang="fr-BE" sz="2400" b="0" u="none" strike="noStrike" baseline="0" dirty="0">
+                <a:solidFill>
+                  <a:srgbClr val="000000"/>
+                </a:solidFill>
+                <a:latin typeface="Bahnschrift" panose="020B0502040204020203" pitchFamily="34" charset="0"/>
+              </a:rPr>
+              <a:t>, </a:t>
+            </a:r>
+            <a:r>
+              <a:rPr lang="fr-BE" sz="2400" b="0" u="none" strike="noStrike" baseline="0" dirty="0" err="1">
+                <a:solidFill>
+                  <a:srgbClr val="000000"/>
+                </a:solidFill>
+                <a:latin typeface="Bahnschrift" panose="020B0502040204020203" pitchFamily="34" charset="0"/>
+              </a:rPr>
+              <a:t>J.C.Williams</a:t>
+            </a:r>
+            <a:r>
+              <a:rPr lang="fr-BE" sz="2400" b="0" u="none" strike="noStrike" baseline="0" dirty="0">
+                <a:solidFill>
+                  <a:srgbClr val="000000"/>
+                </a:solidFill>
+                <a:latin typeface="Bahnschrift" panose="020B0502040204020203" pitchFamily="34" charset="0"/>
+              </a:rPr>
+              <a:t>, </a:t>
+            </a:r>
+            <a:r>
+              <a:rPr lang="fr-BE" sz="2400" b="0" u="none" strike="noStrike" baseline="0" dirty="0" err="1">
+                <a:solidFill>
+                  <a:srgbClr val="000000"/>
+                </a:solidFill>
+                <a:latin typeface="Bahnschrift" panose="020B0502040204020203" pitchFamily="34" charset="0"/>
+              </a:rPr>
+              <a:t>V.Prabhakaran</a:t>
+            </a:r>
+            <a:r>
+              <a:rPr lang="fr-BE" sz="2400" b="0" u="none" strike="noStrike" baseline="0" dirty="0">
+                <a:solidFill>
+                  <a:srgbClr val="000000"/>
+                </a:solidFill>
+                <a:latin typeface="Bahnschrift" panose="020B0502040204020203" pitchFamily="34" charset="0"/>
+              </a:rPr>
+              <a:t>.</a:t>
+            </a:r>
+            <a:r>
+              <a:rPr lang="fr-BE" sz="2400" b="0" i="1" u="none" strike="noStrike" baseline="0" dirty="0">
+                <a:solidFill>
+                  <a:srgbClr val="000000"/>
+                </a:solidFill>
+                <a:latin typeface="Bahnschrift" panose="020B0502040204020203" pitchFamily="34" charset="0"/>
+              </a:rPr>
+              <a:t> </a:t>
+            </a:r>
+            <a:r>
+              <a:rPr lang="fr-BE" sz="2400" i="1" u="none" strike="noStrike" baseline="0" dirty="0">
+                <a:solidFill>
+                  <a:srgbClr val="000000"/>
+                </a:solidFill>
+                <a:latin typeface="Bahnschrift" panose="020B0502040204020203" pitchFamily="34" charset="0"/>
+              </a:rPr>
+              <a:t>DTI </a:t>
+            </a:r>
+            <a:r>
+              <a:rPr lang="fr-BE" sz="2400" i="1" u="none" strike="noStrike" baseline="0" dirty="0" err="1">
+                <a:solidFill>
+                  <a:srgbClr val="000000"/>
+                </a:solidFill>
+                <a:latin typeface="Bahnschrift" panose="020B0502040204020203" pitchFamily="34" charset="0"/>
+              </a:rPr>
+              <a:t>measures</a:t>
+            </a:r>
+            <a:r>
+              <a:rPr lang="fr-BE" sz="2400" i="1" u="none" strike="noStrike" baseline="0" dirty="0">
+                <a:solidFill>
+                  <a:srgbClr val="000000"/>
+                </a:solidFill>
+                <a:latin typeface="Bahnschrift" panose="020B0502040204020203" pitchFamily="34" charset="0"/>
+              </a:rPr>
+              <a:t> </a:t>
+            </a:r>
+            <a:r>
+              <a:rPr lang="fr-BE" sz="2400" i="1" u="none" strike="noStrike" baseline="0" dirty="0" err="1">
+                <a:solidFill>
+                  <a:srgbClr val="000000"/>
+                </a:solidFill>
+                <a:latin typeface="Bahnschrift" panose="020B0502040204020203" pitchFamily="34" charset="0"/>
+              </a:rPr>
+              <a:t>track</a:t>
+            </a:r>
+            <a:r>
+              <a:rPr lang="fr-BE" sz="2400" i="1" u="none" strike="noStrike" baseline="0" dirty="0">
+                <a:solidFill>
+                  <a:srgbClr val="000000"/>
+                </a:solidFill>
+                <a:latin typeface="Bahnschrift" panose="020B0502040204020203" pitchFamily="34" charset="0"/>
+              </a:rPr>
+              <a:t> and </a:t>
+            </a:r>
+            <a:r>
+              <a:rPr lang="fr-BE" sz="2400" i="1" u="none" strike="noStrike" baseline="0" dirty="0" err="1">
+                <a:solidFill>
+                  <a:srgbClr val="000000"/>
+                </a:solidFill>
+                <a:latin typeface="Bahnschrift" panose="020B0502040204020203" pitchFamily="34" charset="0"/>
+              </a:rPr>
+              <a:t>predict</a:t>
+            </a:r>
+            <a:r>
+              <a:rPr lang="fr-BE" sz="2400" i="1" u="none" strike="noStrike" baseline="0" dirty="0">
+                <a:solidFill>
+                  <a:srgbClr val="000000"/>
+                </a:solidFill>
+                <a:latin typeface="Bahnschrift" panose="020B0502040204020203" pitchFamily="34" charset="0"/>
+              </a:rPr>
+              <a:t> </a:t>
+            </a:r>
+            <a:r>
+              <a:rPr lang="fr-BE" sz="2400" i="1" u="none" strike="noStrike" baseline="0" dirty="0" err="1">
+                <a:solidFill>
+                  <a:srgbClr val="000000"/>
+                </a:solidFill>
+                <a:latin typeface="Bahnschrift" panose="020B0502040204020203" pitchFamily="34" charset="0"/>
+              </a:rPr>
+              <a:t>motor</a:t>
+            </a:r>
+            <a:r>
+              <a:rPr lang="fr-BE" sz="2400" i="1" u="none" strike="noStrike" baseline="0" dirty="0">
+                <a:solidFill>
+                  <a:srgbClr val="000000"/>
+                </a:solidFill>
+                <a:latin typeface="Bahnschrift" panose="020B0502040204020203" pitchFamily="34" charset="0"/>
+              </a:rPr>
+              <a:t> </a:t>
+            </a:r>
+            <a:r>
+              <a:rPr lang="fr-BE" sz="2400" i="1" u="none" strike="noStrike" baseline="0" dirty="0" err="1">
+                <a:solidFill>
+                  <a:srgbClr val="000000"/>
+                </a:solidFill>
+                <a:latin typeface="Bahnschrift" panose="020B0502040204020203" pitchFamily="34" charset="0"/>
+              </a:rPr>
+              <a:t>function</a:t>
+            </a:r>
+            <a:r>
+              <a:rPr lang="fr-BE" sz="2400" i="1" u="none" strike="noStrike" baseline="0" dirty="0">
+                <a:solidFill>
+                  <a:srgbClr val="000000"/>
+                </a:solidFill>
+                <a:latin typeface="Bahnschrift" panose="020B0502040204020203" pitchFamily="34" charset="0"/>
+              </a:rPr>
+              <a:t> </a:t>
+            </a:r>
+            <a:r>
+              <a:rPr lang="fr-BE" sz="2400" i="1" u="none" strike="noStrike" baseline="0" dirty="0" err="1">
+                <a:solidFill>
+                  <a:srgbClr val="000000"/>
+                </a:solidFill>
+                <a:latin typeface="Bahnschrift" panose="020B0502040204020203" pitchFamily="34" charset="0"/>
+              </a:rPr>
+              <a:t>outcomes</a:t>
+            </a:r>
+            <a:r>
+              <a:rPr lang="fr-BE" sz="2400" i="1" u="none" strike="noStrike" baseline="0" dirty="0">
+                <a:solidFill>
+                  <a:srgbClr val="000000"/>
+                </a:solidFill>
+                <a:latin typeface="Bahnschrift" panose="020B0502040204020203" pitchFamily="34" charset="0"/>
+              </a:rPr>
+              <a:t> in stroke </a:t>
+            </a:r>
+            <a:r>
+              <a:rPr lang="fr-BE" sz="2400" i="1" u="none" strike="noStrike" baseline="0" dirty="0" err="1">
+                <a:solidFill>
+                  <a:srgbClr val="000000"/>
+                </a:solidFill>
+                <a:latin typeface="Bahnschrift" panose="020B0502040204020203" pitchFamily="34" charset="0"/>
+              </a:rPr>
+              <a:t>rehabilitation</a:t>
+            </a:r>
+            <a:r>
+              <a:rPr lang="fr-BE" sz="2400" i="1" u="none" strike="noStrike" baseline="0" dirty="0">
+                <a:solidFill>
+                  <a:srgbClr val="000000"/>
+                </a:solidFill>
+                <a:latin typeface="Bahnschrift" panose="020B0502040204020203" pitchFamily="34" charset="0"/>
+              </a:rPr>
+              <a:t> </a:t>
+            </a:r>
+            <a:r>
+              <a:rPr lang="fr-BE" sz="2400" i="1" u="none" strike="noStrike" baseline="0" dirty="0" err="1">
+                <a:solidFill>
+                  <a:srgbClr val="000000"/>
+                </a:solidFill>
+                <a:latin typeface="Bahnschrift" panose="020B0502040204020203" pitchFamily="34" charset="0"/>
+              </a:rPr>
+              <a:t>utilizing</a:t>
+            </a:r>
+            <a:r>
+              <a:rPr lang="fr-BE" sz="2400" i="1" u="none" strike="noStrike" baseline="0" dirty="0">
+                <a:solidFill>
+                  <a:srgbClr val="000000"/>
+                </a:solidFill>
+                <a:latin typeface="Bahnschrift" panose="020B0502040204020203" pitchFamily="34" charset="0"/>
+              </a:rPr>
+              <a:t> BCI </a:t>
+            </a:r>
+            <a:r>
+              <a:rPr lang="fr-BE" sz="2400" i="1" u="none" strike="noStrike" baseline="0" dirty="0" err="1">
+                <a:solidFill>
+                  <a:srgbClr val="000000"/>
+                </a:solidFill>
+                <a:latin typeface="Bahnschrift" panose="020B0502040204020203" pitchFamily="34" charset="0"/>
+              </a:rPr>
+              <a:t>technology</a:t>
+            </a:r>
+            <a:r>
+              <a:rPr lang="fr-BE" sz="2400" i="1" u="none" strike="noStrike" baseline="0" dirty="0">
+                <a:solidFill>
+                  <a:srgbClr val="000000"/>
+                </a:solidFill>
+                <a:latin typeface="Bahnschrift" panose="020B0502040204020203" pitchFamily="34" charset="0"/>
+              </a:rPr>
+              <a:t> </a:t>
+            </a:r>
+            <a:r>
+              <a:rPr lang="fr-BE" sz="2400" i="1" dirty="0">
+                <a:latin typeface="Bahnschrift" panose="020B0502040204020203" pitchFamily="34" charset="0"/>
+              </a:rPr>
+              <a:t>, </a:t>
+            </a:r>
+            <a:r>
+              <a:rPr lang="fr-BE" sz="2400" i="1" dirty="0" err="1">
+                <a:latin typeface="Bahnschrift" panose="020B0502040204020203" pitchFamily="34" charset="0"/>
+              </a:rPr>
+              <a:t>Frontiers</a:t>
+            </a:r>
+            <a:r>
+              <a:rPr lang="fr-BE" sz="2400" i="1" dirty="0">
+                <a:latin typeface="Bahnschrift" panose="020B0502040204020203" pitchFamily="34" charset="0"/>
+              </a:rPr>
+              <a:t> in Human Neuroscience,</a:t>
+            </a:r>
+            <a:r>
               <a:rPr lang="fr-BE" sz="2400" dirty="0">
                 <a:latin typeface="Bahnschrift" panose="020B0502040204020203" pitchFamily="34" charset="0"/>
               </a:rPr>
-              <a:t>Corrélations entre FA-MD-RD et l’intégrité neuronale</a:t>
-            </a:r>
-          </a:p>
-        </p:txBody>
-      </p:sp>
-      <p:sp>
-        <p:nvSpPr>
-          <p:cNvPr id="4" name="ZoneTexte 3">
-            <a:extLst>
-              <a:ext uri="{FF2B5EF4-FFF2-40B4-BE49-F238E27FC236}">
-                <a16:creationId xmlns:a16="http://schemas.microsoft.com/office/drawing/2014/main" id="{955F97C6-D922-7D96-8E88-D812D326A44D}"/>
+              <a:t> 27 Avril 2015.</a:t>
+            </a:r>
+          </a:p>
+        </p:txBody>
+      </p:sp>
+      <p:sp>
+        <p:nvSpPr>
+          <p:cNvPr id="8" name="Espace réservé du numéro de diapositive 6">
+            <a:extLst>
+              <a:ext uri="{FF2B5EF4-FFF2-40B4-BE49-F238E27FC236}">
+                <a16:creationId xmlns:a16="http://schemas.microsoft.com/office/drawing/2014/main" id="{C6927F8A-DEC7-E806-F5FD-4BBAFB06FA46}"/>
+              </a:ext>
+            </a:extLst>
+          </p:cNvPr>
+          <p:cNvSpPr>
+            <a:spLocks noGrp="1"/>
+          </p:cNvSpPr>
+          <p:nvPr>
+            <p:ph type="sldNum" sz="quarter" idx="12"/>
+          </p:nvPr>
+        </p:nvSpPr>
+        <p:spPr>
+          <a:xfrm>
+            <a:off x="8610600" y="6356350"/>
+            <a:ext cx="2743200" cy="365125"/>
+          </a:xfrm>
+        </p:spPr>
+        <p:txBody>
+          <a:bodyPr/>
+          <a:lstStyle/>
+          <a:p>
+            <a:fld id="{187BEF47-448A-4600-B2F3-29BC55E386D0}" type="slidenum">
+              <a:rPr lang="fr-BE" sz="2000" smtClean="0">
+                <a:latin typeface="Bahnschrift" panose="020B0502040204020203" pitchFamily="34" charset="0"/>
+              </a:rPr>
+              <a:t>12</a:t>
+            </a:fld>
+            <a:endParaRPr lang="fr-BE" sz="2000" dirty="0">
+              <a:latin typeface="Bahnschrift" panose="020B0502040204020203" pitchFamily="34" charset="0"/>
+            </a:endParaRPr>
+          </a:p>
+        </p:txBody>
+      </p:sp>
+    </p:spTree>
+    <p:extLst>
+      <p:ext uri="{BB962C8B-B14F-4D97-AF65-F5344CB8AC3E}">
+        <p14:creationId xmlns:p14="http://schemas.microsoft.com/office/powerpoint/2010/main" val="1769865713"/>
+      </p:ext>
+    </p:extLst>
+  </p:cSld>
+  <p:clrMapOvr>
+    <a:masterClrMapping/>
+  </p:clrMapOvr>
+</p:sld>
+</file>
+
+<file path=ppt/slides/slide13.xml><?xml version="1.0" encoding="utf-8"?>
+<p:sld xmlns:a="http://schemas.openxmlformats.org/drawingml/2006/main" xmlns:r="http://schemas.openxmlformats.org/officeDocument/2006/relationships" xmlns:p="http://schemas.openxmlformats.org/presentationml/2006/main">
+  <p:cSld>
+    <p:spTree>
+      <p:nvGrpSpPr>
+        <p:cNvPr id="1" name=""/>
+        <p:cNvGrpSpPr/>
+        <p:nvPr/>
+      </p:nvGrpSpPr>
+      <p:grpSpPr>
+        <a:xfrm>
+          <a:off x="0" y="0"/>
+          <a:ext cx="0" cy="0"/>
+          <a:chOff x="0" y="0"/>
+          <a:chExt cx="0" cy="0"/>
+        </a:xfrm>
+      </p:grpSpPr>
+      <p:sp>
+        <p:nvSpPr>
+          <p:cNvPr id="2" name="Titre 1">
+            <a:extLst>
+              <a:ext uri="{FF2B5EF4-FFF2-40B4-BE49-F238E27FC236}">
+                <a16:creationId xmlns:a16="http://schemas.microsoft.com/office/drawing/2014/main" id="{F39A73F1-1CE9-752D-86A3-CA17B67B5E4D}"/>
+              </a:ext>
+            </a:extLst>
+          </p:cNvPr>
+          <p:cNvSpPr>
+            <a:spLocks noGrp="1"/>
+          </p:cNvSpPr>
+          <p:nvPr>
+            <p:ph type="title"/>
+          </p:nvPr>
+        </p:nvSpPr>
+        <p:spPr>
+          <a:xfrm>
+            <a:off x="838199" y="365125"/>
+            <a:ext cx="10582275" cy="1325563"/>
+          </a:xfrm>
+        </p:spPr>
+        <p:txBody>
+          <a:bodyPr>
+            <a:normAutofit/>
+          </a:bodyPr>
+          <a:lstStyle/>
+          <a:p>
+            <a:r>
+              <a:rPr lang="fr-BE" sz="4400" dirty="0">
+                <a:latin typeface="Bahnschrift" panose="020B0502040204020203" pitchFamily="34" charset="0"/>
+              </a:rPr>
+              <a:t>AVC : Gains théoriques</a:t>
+            </a:r>
+            <a:endParaRPr lang="fr-BE" dirty="0"/>
+          </a:p>
+        </p:txBody>
+      </p:sp>
+      <p:sp>
+        <p:nvSpPr>
+          <p:cNvPr id="5" name="ZoneTexte 4">
+            <a:extLst>
+              <a:ext uri="{FF2B5EF4-FFF2-40B4-BE49-F238E27FC236}">
+                <a16:creationId xmlns:a16="http://schemas.microsoft.com/office/drawing/2014/main" id="{497AB441-149B-8ADA-9472-E9239B51F701}"/>
               </a:ext>
             </a:extLst>
           </p:cNvPr>
@@ -4331,8 +5311,8 @@
         </p:nvSpPr>
         <p:spPr>
           <a:xfrm>
-            <a:off x="1809748" y="2781003"/>
-            <a:ext cx="9725025" cy="461665"/>
+            <a:off x="1871615" y="2848381"/>
+            <a:ext cx="9725025" cy="830997"/>
           </a:xfrm>
           <a:prstGeom prst="rect">
             <a:avLst/>
@@ -4353,17 +5333,17 @@
               <a:rPr lang="fr-BE" sz="2400" dirty="0">
                 <a:latin typeface="Bahnschrift" panose="020B0502040204020203" pitchFamily="34" charset="0"/>
               </a:rPr>
-              <a:t>Mécanisme et causes de l’AVC ischémique</a:t>
-            </a:r>
-          </a:p>
-        </p:txBody>
-      </p:sp>
-      <p:sp>
-        <p:nvSpPr>
-          <p:cNvPr id="7" name="ZoneTexte 6">
-            <a:extLst>
-              <a:ext uri="{FF2B5EF4-FFF2-40B4-BE49-F238E27FC236}">
-                <a16:creationId xmlns:a16="http://schemas.microsoft.com/office/drawing/2014/main" id="{507A3BB6-DC4B-2A28-052A-419729800449}"/>
+              <a:t>Corrélations entre FA-MD-RD et intégrité neuronale – habileté motrice </a:t>
+            </a:r>
+          </a:p>
+        </p:txBody>
+      </p:sp>
+      <p:sp>
+        <p:nvSpPr>
+          <p:cNvPr id="4" name="ZoneTexte 3">
+            <a:extLst>
+              <a:ext uri="{FF2B5EF4-FFF2-40B4-BE49-F238E27FC236}">
+                <a16:creationId xmlns:a16="http://schemas.microsoft.com/office/drawing/2014/main" id="{955F97C6-D922-7D96-8E88-D812D326A44D}"/>
               </a:ext>
             </a:extLst>
           </p:cNvPr>
@@ -4372,7 +5352,7 @@
         </p:nvSpPr>
         <p:spPr>
           <a:xfrm>
-            <a:off x="1809748" y="3540742"/>
+            <a:off x="1871618" y="2025994"/>
             <a:ext cx="9725025" cy="461665"/>
           </a:xfrm>
           <a:prstGeom prst="rect">
@@ -4394,8 +5374,87 @@
               <a:rPr lang="fr-BE" sz="2400" dirty="0">
                 <a:latin typeface="Bahnschrift" panose="020B0502040204020203" pitchFamily="34" charset="0"/>
               </a:rPr>
-              <a:t>DTI – NODDI – DIAMOND – MF : Avantages et limitations</a:t>
-            </a:r>
+              <a:t>Mécanisme et causes de l’AVC ischémique</a:t>
+            </a:r>
+          </a:p>
+        </p:txBody>
+      </p:sp>
+      <p:sp>
+        <p:nvSpPr>
+          <p:cNvPr id="7" name="ZoneTexte 6">
+            <a:extLst>
+              <a:ext uri="{FF2B5EF4-FFF2-40B4-BE49-F238E27FC236}">
+                <a16:creationId xmlns:a16="http://schemas.microsoft.com/office/drawing/2014/main" id="{507A3BB6-DC4B-2A28-052A-419729800449}"/>
+              </a:ext>
+            </a:extLst>
+          </p:cNvPr>
+          <p:cNvSpPr txBox="1"/>
+          <p:nvPr/>
+        </p:nvSpPr>
+        <p:spPr>
+          <a:xfrm>
+            <a:off x="1871614" y="4040100"/>
+            <a:ext cx="9725025" cy="461665"/>
+          </a:xfrm>
+          <a:prstGeom prst="rect">
+            <a:avLst/>
+          </a:prstGeom>
+          <a:noFill/>
+        </p:spPr>
+        <p:txBody>
+          <a:bodyPr wrap="square" rtlCol="0">
+            <a:spAutoFit/>
+          </a:bodyPr>
+          <a:lstStyle/>
+          <a:p>
+            <a:pPr marL="342900" indent="-342900">
+              <a:buFont typeface="Arial" panose="020B0604020202020204" pitchFamily="34" charset="0"/>
+              <a:buChar char="•"/>
+            </a:pPr>
+            <a:r>
+              <a:rPr lang="fr-BE" sz="2400" dirty="0">
+                <a:latin typeface="Bahnschrift" panose="020B0502040204020203" pitchFamily="34" charset="0"/>
+              </a:rPr>
+              <a:t>Valeur ajoutée du sujet</a:t>
+            </a:r>
+          </a:p>
+        </p:txBody>
+      </p:sp>
+      <p:sp>
+        <p:nvSpPr>
+          <p:cNvPr id="6" name="Espace réservé du numéro de diapositive 6">
+            <a:extLst>
+              <a:ext uri="{FF2B5EF4-FFF2-40B4-BE49-F238E27FC236}">
+                <a16:creationId xmlns:a16="http://schemas.microsoft.com/office/drawing/2014/main" id="{2E077910-E813-50D7-0005-A3E5D2FF155F}"/>
+              </a:ext>
+            </a:extLst>
+          </p:cNvPr>
+          <p:cNvSpPr>
+            <a:spLocks noGrp="1"/>
+          </p:cNvSpPr>
+          <p:nvPr>
+            <p:ph type="sldNum" sz="quarter" idx="12"/>
+          </p:nvPr>
+        </p:nvSpPr>
+        <p:spPr>
+          <a:xfrm>
+            <a:off x="8610600" y="6356350"/>
+            <a:ext cx="2743200" cy="365125"/>
+          </a:xfrm>
+        </p:spPr>
+        <p:txBody>
+          <a:bodyPr/>
+          <a:lstStyle/>
+          <a:p>
+            <a:fld id="{187BEF47-448A-4600-B2F3-29BC55E386D0}" type="slidenum">
+              <a:rPr lang="fr-BE" sz="2000" smtClean="0">
+                <a:latin typeface="Bahnschrift" panose="020B0502040204020203" pitchFamily="34" charset="0"/>
+              </a:rPr>
+              <a:t>13</a:t>
+            </a:fld>
+            <a:endParaRPr lang="fr-BE" sz="2000" dirty="0">
+              <a:latin typeface="Bahnschrift" panose="020B0502040204020203" pitchFamily="34" charset="0"/>
+            </a:endParaRPr>
           </a:p>
         </p:txBody>
       </p:sp>
@@ -4403,6 +5462,579 @@
     <p:extLst>
       <p:ext uri="{BB962C8B-B14F-4D97-AF65-F5344CB8AC3E}">
         <p14:creationId xmlns:p14="http://schemas.microsoft.com/office/powerpoint/2010/main" val="3971020957"/>
+      </p:ext>
+    </p:extLst>
+  </p:cSld>
+  <p:clrMapOvr>
+    <a:masterClrMapping/>
+  </p:clrMapOvr>
+</p:sld>
+</file>
+
+<file path=ppt/slides/slide14.xml><?xml version="1.0" encoding="utf-8"?>
+<p:sld xmlns:a="http://schemas.openxmlformats.org/drawingml/2006/main" xmlns:r="http://schemas.openxmlformats.org/officeDocument/2006/relationships" xmlns:p="http://schemas.openxmlformats.org/presentationml/2006/main">
+  <p:cSld>
+    <p:spTree>
+      <p:nvGrpSpPr>
+        <p:cNvPr id="1" name=""/>
+        <p:cNvGrpSpPr/>
+        <p:nvPr/>
+      </p:nvGrpSpPr>
+      <p:grpSpPr>
+        <a:xfrm>
+          <a:off x="0" y="0"/>
+          <a:ext cx="0" cy="0"/>
+          <a:chOff x="0" y="0"/>
+          <a:chExt cx="0" cy="0"/>
+        </a:xfrm>
+      </p:grpSpPr>
+      <p:sp>
+        <p:nvSpPr>
+          <p:cNvPr id="4" name="Titre 1">
+            <a:extLst>
+              <a:ext uri="{FF2B5EF4-FFF2-40B4-BE49-F238E27FC236}">
+                <a16:creationId xmlns:a16="http://schemas.microsoft.com/office/drawing/2014/main" id="{8729A5A1-302D-AF6C-BBFD-09A78D586A84}"/>
+              </a:ext>
+            </a:extLst>
+          </p:cNvPr>
+          <p:cNvSpPr>
+            <a:spLocks noGrp="1"/>
+          </p:cNvSpPr>
+          <p:nvPr>
+            <p:ph type="title"/>
+          </p:nvPr>
+        </p:nvSpPr>
+        <p:spPr>
+          <a:xfrm>
+            <a:off x="838199" y="365125"/>
+            <a:ext cx="10582275" cy="1325563"/>
+          </a:xfrm>
+        </p:spPr>
+        <p:txBody>
+          <a:bodyPr>
+            <a:normAutofit/>
+          </a:bodyPr>
+          <a:lstStyle/>
+          <a:p>
+            <a:r>
+              <a:rPr lang="fr-BE" dirty="0">
+                <a:latin typeface="Bahnschrift" panose="020B0502040204020203" pitchFamily="34" charset="0"/>
+              </a:rPr>
+              <a:t>Prochains objectifs</a:t>
+            </a:r>
+          </a:p>
+        </p:txBody>
+      </p:sp>
+      <p:sp>
+        <p:nvSpPr>
+          <p:cNvPr id="5" name="ZoneTexte 4">
+            <a:extLst>
+              <a:ext uri="{FF2B5EF4-FFF2-40B4-BE49-F238E27FC236}">
+                <a16:creationId xmlns:a16="http://schemas.microsoft.com/office/drawing/2014/main" id="{F860F2C9-00E3-529E-BAFF-B7D50D6739B6}"/>
+              </a:ext>
+            </a:extLst>
+          </p:cNvPr>
+          <p:cNvSpPr txBox="1"/>
+          <p:nvPr/>
+        </p:nvSpPr>
+        <p:spPr>
+          <a:xfrm>
+            <a:off x="1695449" y="1824658"/>
+            <a:ext cx="9344463" cy="2862322"/>
+          </a:xfrm>
+          <a:prstGeom prst="rect">
+            <a:avLst/>
+          </a:prstGeom>
+          <a:noFill/>
+        </p:spPr>
+        <p:txBody>
+          <a:bodyPr wrap="square" rtlCol="0">
+            <a:spAutoFit/>
+          </a:bodyPr>
+          <a:lstStyle/>
+          <a:p>
+            <a:r>
+              <a:rPr lang="fr-BE" sz="3600" dirty="0">
+                <a:latin typeface="Bahnschrift" panose="020B0502040204020203" pitchFamily="34" charset="0"/>
+              </a:rPr>
+              <a:t>Investigation théorique concernant :</a:t>
+            </a:r>
+          </a:p>
+          <a:p>
+            <a:pPr marL="1028700" lvl="1" indent="-571500">
+              <a:buFont typeface="Arial" panose="020B0604020202020204" pitchFamily="34" charset="0"/>
+              <a:buChar char="•"/>
+            </a:pPr>
+            <a:endParaRPr lang="fr-BE" sz="2400" dirty="0">
+              <a:latin typeface="Bahnschrift" panose="020B0502040204020203" pitchFamily="34" charset="0"/>
+            </a:endParaRPr>
+          </a:p>
+          <a:p>
+            <a:pPr marL="800100" lvl="1" indent="-342900">
+              <a:buFont typeface="Arial" panose="020B0604020202020204" pitchFamily="34" charset="0"/>
+              <a:buChar char="•"/>
+            </a:pPr>
+            <a:r>
+              <a:rPr lang="fr-BE" sz="2400" dirty="0">
+                <a:latin typeface="Bahnschrift" panose="020B0502040204020203" pitchFamily="34" charset="0"/>
+              </a:rPr>
+              <a:t>Les mécanismes biologiques post-AVC</a:t>
+            </a:r>
+          </a:p>
+          <a:p>
+            <a:pPr marL="800100" lvl="1" indent="-342900">
+              <a:buFont typeface="Arial" panose="020B0604020202020204" pitchFamily="34" charset="0"/>
+              <a:buChar char="•"/>
+            </a:pPr>
+            <a:endParaRPr lang="fr-BE" sz="2400" dirty="0">
+              <a:latin typeface="Bahnschrift" panose="020B0502040204020203" pitchFamily="34" charset="0"/>
+            </a:endParaRPr>
+          </a:p>
+          <a:p>
+            <a:pPr marL="800100" lvl="1" indent="-342900">
+              <a:buFont typeface="Arial" panose="020B0604020202020204" pitchFamily="34" charset="0"/>
+              <a:buChar char="•"/>
+            </a:pPr>
+            <a:r>
+              <a:rPr lang="fr-BE" sz="2400" dirty="0">
+                <a:latin typeface="Bahnschrift" panose="020B0502040204020203" pitchFamily="34" charset="0"/>
+              </a:rPr>
+              <a:t>L’anatomie du cerveau</a:t>
+            </a:r>
+          </a:p>
+          <a:p>
+            <a:pPr marL="800100" lvl="1" indent="-342900">
+              <a:buFont typeface="Arial" panose="020B0604020202020204" pitchFamily="34" charset="0"/>
+              <a:buChar char="•"/>
+            </a:pPr>
+            <a:endParaRPr lang="fr-BE" sz="2400" dirty="0">
+              <a:latin typeface="Bahnschrift" panose="020B0502040204020203" pitchFamily="34" charset="0"/>
+            </a:endParaRPr>
+          </a:p>
+          <a:p>
+            <a:pPr marL="800100" lvl="1" indent="-342900">
+              <a:buFont typeface="Arial" panose="020B0604020202020204" pitchFamily="34" charset="0"/>
+              <a:buChar char="•"/>
+            </a:pPr>
+            <a:r>
+              <a:rPr lang="fr-BE" sz="2400" dirty="0">
+                <a:latin typeface="Bahnschrift" panose="020B0502040204020203" pitchFamily="34" charset="0"/>
+              </a:rPr>
+              <a:t>Le traitement d’images médicales</a:t>
+            </a:r>
+          </a:p>
+        </p:txBody>
+      </p:sp>
+      <p:sp>
+        <p:nvSpPr>
+          <p:cNvPr id="7" name="Espace réservé du numéro de diapositive 6">
+            <a:extLst>
+              <a:ext uri="{FF2B5EF4-FFF2-40B4-BE49-F238E27FC236}">
+                <a16:creationId xmlns:a16="http://schemas.microsoft.com/office/drawing/2014/main" id="{CE8DF02A-3844-CA42-9A42-5FFD8580CB1E}"/>
+              </a:ext>
+            </a:extLst>
+          </p:cNvPr>
+          <p:cNvSpPr>
+            <a:spLocks noGrp="1"/>
+          </p:cNvSpPr>
+          <p:nvPr>
+            <p:ph type="sldNum" sz="quarter" idx="12"/>
+          </p:nvPr>
+        </p:nvSpPr>
+        <p:spPr>
+          <a:xfrm>
+            <a:off x="8610600" y="6356350"/>
+            <a:ext cx="2743200" cy="365125"/>
+          </a:xfrm>
+        </p:spPr>
+        <p:txBody>
+          <a:bodyPr/>
+          <a:lstStyle/>
+          <a:p>
+            <a:fld id="{187BEF47-448A-4600-B2F3-29BC55E386D0}" type="slidenum">
+              <a:rPr lang="fr-BE" sz="2000" smtClean="0">
+                <a:latin typeface="Bahnschrift" panose="020B0502040204020203" pitchFamily="34" charset="0"/>
+              </a:rPr>
+              <a:t>14</a:t>
+            </a:fld>
+            <a:endParaRPr lang="fr-BE" sz="2000" dirty="0">
+              <a:latin typeface="Bahnschrift" panose="020B0502040204020203" pitchFamily="34" charset="0"/>
+            </a:endParaRPr>
+          </a:p>
+        </p:txBody>
+      </p:sp>
+    </p:spTree>
+    <p:extLst>
+      <p:ext uri="{BB962C8B-B14F-4D97-AF65-F5344CB8AC3E}">
+        <p14:creationId xmlns:p14="http://schemas.microsoft.com/office/powerpoint/2010/main" val="2712302430"/>
+      </p:ext>
+    </p:extLst>
+  </p:cSld>
+  <p:clrMapOvr>
+    <a:masterClrMapping/>
+  </p:clrMapOvr>
+</p:sld>
+</file>
+
+<file path=ppt/slides/slide15.xml><?xml version="1.0" encoding="utf-8"?>
+<p:sld xmlns:a="http://schemas.openxmlformats.org/drawingml/2006/main" xmlns:r="http://schemas.openxmlformats.org/officeDocument/2006/relationships" xmlns:p="http://schemas.openxmlformats.org/presentationml/2006/main">
+  <p:cSld>
+    <p:spTree>
+      <p:nvGrpSpPr>
+        <p:cNvPr id="1" name=""/>
+        <p:cNvGrpSpPr/>
+        <p:nvPr/>
+      </p:nvGrpSpPr>
+      <p:grpSpPr>
+        <a:xfrm>
+          <a:off x="0" y="0"/>
+          <a:ext cx="0" cy="0"/>
+          <a:chOff x="0" y="0"/>
+          <a:chExt cx="0" cy="0"/>
+        </a:xfrm>
+      </p:grpSpPr>
+      <p:sp>
+        <p:nvSpPr>
+          <p:cNvPr id="4" name="Titre 1">
+            <a:extLst>
+              <a:ext uri="{FF2B5EF4-FFF2-40B4-BE49-F238E27FC236}">
+                <a16:creationId xmlns:a16="http://schemas.microsoft.com/office/drawing/2014/main" id="{8729A5A1-302D-AF6C-BBFD-09A78D586A84}"/>
+              </a:ext>
+            </a:extLst>
+          </p:cNvPr>
+          <p:cNvSpPr>
+            <a:spLocks noGrp="1"/>
+          </p:cNvSpPr>
+          <p:nvPr>
+            <p:ph type="title"/>
+          </p:nvPr>
+        </p:nvSpPr>
+        <p:spPr>
+          <a:xfrm>
+            <a:off x="838199" y="365125"/>
+            <a:ext cx="10582275" cy="1325563"/>
+          </a:xfrm>
+        </p:spPr>
+        <p:txBody>
+          <a:bodyPr>
+            <a:normAutofit/>
+          </a:bodyPr>
+          <a:lstStyle/>
+          <a:p>
+            <a:r>
+              <a:rPr lang="fr-BE" dirty="0">
+                <a:latin typeface="Bahnschrift" panose="020B0502040204020203" pitchFamily="34" charset="0"/>
+              </a:rPr>
+              <a:t>Prochains objectifs</a:t>
+            </a:r>
+          </a:p>
+        </p:txBody>
+      </p:sp>
+      <p:sp>
+        <p:nvSpPr>
+          <p:cNvPr id="5" name="ZoneTexte 4">
+            <a:extLst>
+              <a:ext uri="{FF2B5EF4-FFF2-40B4-BE49-F238E27FC236}">
+                <a16:creationId xmlns:a16="http://schemas.microsoft.com/office/drawing/2014/main" id="{F860F2C9-00E3-529E-BAFF-B7D50D6739B6}"/>
+              </a:ext>
+            </a:extLst>
+          </p:cNvPr>
+          <p:cNvSpPr txBox="1"/>
+          <p:nvPr/>
+        </p:nvSpPr>
+        <p:spPr>
+          <a:xfrm>
+            <a:off x="1695449" y="1824658"/>
+            <a:ext cx="9344463" cy="3231654"/>
+          </a:xfrm>
+          <a:prstGeom prst="rect">
+            <a:avLst/>
+          </a:prstGeom>
+          <a:noFill/>
+        </p:spPr>
+        <p:txBody>
+          <a:bodyPr wrap="square" rtlCol="0">
+            <a:spAutoFit/>
+          </a:bodyPr>
+          <a:lstStyle/>
+          <a:p>
+            <a:r>
+              <a:rPr lang="fr-BE" sz="3600" dirty="0">
+                <a:latin typeface="Bahnschrift" panose="020B0502040204020203" pitchFamily="34" charset="0"/>
+              </a:rPr>
+              <a:t>Confrontation avec le jeu de données</a:t>
+            </a:r>
+          </a:p>
+          <a:p>
+            <a:pPr marL="1028700" lvl="1" indent="-571500">
+              <a:buFont typeface="Arial" panose="020B0604020202020204" pitchFamily="34" charset="0"/>
+              <a:buChar char="•"/>
+            </a:pPr>
+            <a:endParaRPr lang="fr-BE" sz="2400" dirty="0">
+              <a:latin typeface="Bahnschrift" panose="020B0502040204020203" pitchFamily="34" charset="0"/>
+            </a:endParaRPr>
+          </a:p>
+          <a:p>
+            <a:pPr marL="800100" lvl="1" indent="-342900">
+              <a:buFont typeface="Wingdings" panose="05000000000000000000" pitchFamily="2" charset="2"/>
+              <a:buChar char="Ø"/>
+            </a:pPr>
+            <a:r>
+              <a:rPr lang="fr-BE" sz="2400" dirty="0">
+                <a:latin typeface="Bahnschrift" panose="020B0502040204020203" pitchFamily="34" charset="0"/>
+              </a:rPr>
+              <a:t>Cadre pratique pour soutenir les nouvelles bases théoriques (Visualisation des différentes méthodes et métriques)</a:t>
+            </a:r>
+          </a:p>
+          <a:p>
+            <a:pPr marL="800100" lvl="1" indent="-342900">
+              <a:buFont typeface="Wingdings" panose="05000000000000000000" pitchFamily="2" charset="2"/>
+              <a:buChar char="Ø"/>
+            </a:pPr>
+            <a:endParaRPr lang="fr-BE" sz="2400" dirty="0">
+              <a:latin typeface="Bahnschrift" panose="020B0502040204020203" pitchFamily="34" charset="0"/>
+            </a:endParaRPr>
+          </a:p>
+          <a:p>
+            <a:pPr marL="800100" lvl="1" indent="-342900">
+              <a:buFont typeface="Wingdings" panose="05000000000000000000" pitchFamily="2" charset="2"/>
+              <a:buChar char="Ø"/>
+            </a:pPr>
+            <a:r>
+              <a:rPr lang="fr-BE" sz="2400" dirty="0">
+                <a:latin typeface="Bahnschrift" panose="020B0502040204020203" pitchFamily="34" charset="0"/>
+              </a:rPr>
+              <a:t>Familiarisation avec les outils</a:t>
+            </a:r>
+          </a:p>
+          <a:p>
+            <a:pPr marL="800100" lvl="1" indent="-342900">
+              <a:buFont typeface="Wingdings" panose="05000000000000000000" pitchFamily="2" charset="2"/>
+              <a:buChar char="Ø"/>
+            </a:pPr>
+            <a:endParaRPr lang="fr-BE" sz="2400" dirty="0">
+              <a:latin typeface="Bahnschrift" panose="020B0502040204020203" pitchFamily="34" charset="0"/>
+            </a:endParaRPr>
+          </a:p>
+          <a:p>
+            <a:pPr marL="800100" lvl="1" indent="-342900">
+              <a:buFont typeface="Wingdings" panose="05000000000000000000" pitchFamily="2" charset="2"/>
+              <a:buChar char="Ø"/>
+            </a:pPr>
+            <a:r>
+              <a:rPr lang="fr-BE" sz="2400" dirty="0">
+                <a:latin typeface="Bahnschrift" panose="020B0502040204020203" pitchFamily="34" charset="0"/>
+              </a:rPr>
+              <a:t>Identifications d’autres bases théoriques à assimiler</a:t>
+            </a:r>
+          </a:p>
+        </p:txBody>
+      </p:sp>
+      <p:sp>
+        <p:nvSpPr>
+          <p:cNvPr id="3" name="Espace réservé du numéro de diapositive 6">
+            <a:extLst>
+              <a:ext uri="{FF2B5EF4-FFF2-40B4-BE49-F238E27FC236}">
+                <a16:creationId xmlns:a16="http://schemas.microsoft.com/office/drawing/2014/main" id="{AEB2DB40-9F54-5F7C-0CED-B6F21BFEF27B}"/>
+              </a:ext>
+            </a:extLst>
+          </p:cNvPr>
+          <p:cNvSpPr>
+            <a:spLocks noGrp="1"/>
+          </p:cNvSpPr>
+          <p:nvPr>
+            <p:ph type="sldNum" sz="quarter" idx="12"/>
+          </p:nvPr>
+        </p:nvSpPr>
+        <p:spPr>
+          <a:xfrm>
+            <a:off x="8610600" y="6356350"/>
+            <a:ext cx="2743200" cy="365125"/>
+          </a:xfrm>
+        </p:spPr>
+        <p:txBody>
+          <a:bodyPr/>
+          <a:lstStyle/>
+          <a:p>
+            <a:fld id="{187BEF47-448A-4600-B2F3-29BC55E386D0}" type="slidenum">
+              <a:rPr lang="fr-BE" sz="2000" smtClean="0">
+                <a:latin typeface="Bahnschrift" panose="020B0502040204020203" pitchFamily="34" charset="0"/>
+              </a:rPr>
+              <a:t>15</a:t>
+            </a:fld>
+            <a:endParaRPr lang="fr-BE" sz="2000" dirty="0">
+              <a:latin typeface="Bahnschrift" panose="020B0502040204020203" pitchFamily="34" charset="0"/>
+            </a:endParaRPr>
+          </a:p>
+        </p:txBody>
+      </p:sp>
+    </p:spTree>
+    <p:extLst>
+      <p:ext uri="{BB962C8B-B14F-4D97-AF65-F5344CB8AC3E}">
+        <p14:creationId xmlns:p14="http://schemas.microsoft.com/office/powerpoint/2010/main" val="3108498485"/>
+      </p:ext>
+    </p:extLst>
+  </p:cSld>
+  <p:clrMapOvr>
+    <a:masterClrMapping/>
+  </p:clrMapOvr>
+</p:sld>
+</file>
+
+<file path=ppt/slides/slide16.xml><?xml version="1.0" encoding="utf-8"?>
+<p:sld xmlns:a="http://schemas.openxmlformats.org/drawingml/2006/main" xmlns:r="http://schemas.openxmlformats.org/officeDocument/2006/relationships" xmlns:p="http://schemas.openxmlformats.org/presentationml/2006/main">
+  <p:cSld>
+    <p:spTree>
+      <p:nvGrpSpPr>
+        <p:cNvPr id="1" name=""/>
+        <p:cNvGrpSpPr/>
+        <p:nvPr/>
+      </p:nvGrpSpPr>
+      <p:grpSpPr>
+        <a:xfrm>
+          <a:off x="0" y="0"/>
+          <a:ext cx="0" cy="0"/>
+          <a:chOff x="0" y="0"/>
+          <a:chExt cx="0" cy="0"/>
+        </a:xfrm>
+      </p:grpSpPr>
+      <p:sp>
+        <p:nvSpPr>
+          <p:cNvPr id="4" name="Titre 1">
+            <a:extLst>
+              <a:ext uri="{FF2B5EF4-FFF2-40B4-BE49-F238E27FC236}">
+                <a16:creationId xmlns:a16="http://schemas.microsoft.com/office/drawing/2014/main" id="{8729A5A1-302D-AF6C-BBFD-09A78D586A84}"/>
+              </a:ext>
+            </a:extLst>
+          </p:cNvPr>
+          <p:cNvSpPr>
+            <a:spLocks noGrp="1"/>
+          </p:cNvSpPr>
+          <p:nvPr>
+            <p:ph type="title"/>
+          </p:nvPr>
+        </p:nvSpPr>
+        <p:spPr>
+          <a:xfrm>
+            <a:off x="838199" y="365125"/>
+            <a:ext cx="10582275" cy="1325563"/>
+          </a:xfrm>
+        </p:spPr>
+        <p:txBody>
+          <a:bodyPr>
+            <a:normAutofit/>
+          </a:bodyPr>
+          <a:lstStyle/>
+          <a:p>
+            <a:r>
+              <a:rPr lang="fr-BE" dirty="0">
+                <a:latin typeface="Bahnschrift" panose="020B0502040204020203" pitchFamily="34" charset="0"/>
+              </a:rPr>
+              <a:t>Prochains objectifs</a:t>
+            </a:r>
+          </a:p>
+        </p:txBody>
+      </p:sp>
+      <p:sp>
+        <p:nvSpPr>
+          <p:cNvPr id="5" name="ZoneTexte 4">
+            <a:extLst>
+              <a:ext uri="{FF2B5EF4-FFF2-40B4-BE49-F238E27FC236}">
+                <a16:creationId xmlns:a16="http://schemas.microsoft.com/office/drawing/2014/main" id="{F860F2C9-00E3-529E-BAFF-B7D50D6739B6}"/>
+              </a:ext>
+            </a:extLst>
+          </p:cNvPr>
+          <p:cNvSpPr txBox="1"/>
+          <p:nvPr/>
+        </p:nvSpPr>
+        <p:spPr>
+          <a:xfrm>
+            <a:off x="1695449" y="1824658"/>
+            <a:ext cx="9344463" cy="2308324"/>
+          </a:xfrm>
+          <a:prstGeom prst="rect">
+            <a:avLst/>
+          </a:prstGeom>
+          <a:noFill/>
+        </p:spPr>
+        <p:txBody>
+          <a:bodyPr wrap="square" rtlCol="0">
+            <a:spAutoFit/>
+          </a:bodyPr>
+          <a:lstStyle/>
+          <a:p>
+            <a:r>
+              <a:rPr lang="fr-BE" sz="3600" dirty="0">
+                <a:latin typeface="Bahnschrift" panose="020B0502040204020203" pitchFamily="34" charset="0"/>
+              </a:rPr>
+              <a:t>Définition précise du sujet de recherche et clarification du TFE</a:t>
+            </a:r>
+          </a:p>
+          <a:p>
+            <a:pPr marL="1028700" lvl="1" indent="-571500">
+              <a:buFont typeface="Arial" panose="020B0604020202020204" pitchFamily="34" charset="0"/>
+              <a:buChar char="•"/>
+            </a:pPr>
+            <a:endParaRPr lang="fr-BE" sz="2400" dirty="0">
+              <a:latin typeface="Bahnschrift" panose="020B0502040204020203" pitchFamily="34" charset="0"/>
+            </a:endParaRPr>
+          </a:p>
+          <a:p>
+            <a:pPr marL="800100" lvl="1" indent="-342900">
+              <a:buFont typeface="Wingdings" panose="05000000000000000000" pitchFamily="2" charset="2"/>
+              <a:buChar char="Ø"/>
+            </a:pPr>
+            <a:r>
+              <a:rPr lang="fr-BE" sz="2400" dirty="0">
+                <a:latin typeface="Bahnschrift" panose="020B0502040204020203" pitchFamily="34" charset="0"/>
+              </a:rPr>
+              <a:t>Éviter une trop grande dispersion du temps et des efforts investis</a:t>
+            </a:r>
+          </a:p>
+        </p:txBody>
+      </p:sp>
+      <p:sp>
+        <p:nvSpPr>
+          <p:cNvPr id="3" name="Espace réservé du numéro de diapositive 6">
+            <a:extLst>
+              <a:ext uri="{FF2B5EF4-FFF2-40B4-BE49-F238E27FC236}">
+                <a16:creationId xmlns:a16="http://schemas.microsoft.com/office/drawing/2014/main" id="{1E7395C9-95E5-7D68-80AF-65A9F2F48FC4}"/>
+              </a:ext>
+            </a:extLst>
+          </p:cNvPr>
+          <p:cNvSpPr>
+            <a:spLocks noGrp="1"/>
+          </p:cNvSpPr>
+          <p:nvPr>
+            <p:ph type="sldNum" sz="quarter" idx="12"/>
+          </p:nvPr>
+        </p:nvSpPr>
+        <p:spPr>
+          <a:xfrm>
+            <a:off x="8610600" y="6356350"/>
+            <a:ext cx="2743200" cy="365125"/>
+          </a:xfrm>
+        </p:spPr>
+        <p:txBody>
+          <a:bodyPr/>
+          <a:lstStyle/>
+          <a:p>
+            <a:fld id="{187BEF47-448A-4600-B2F3-29BC55E386D0}" type="slidenum">
+              <a:rPr lang="fr-BE" sz="2000" smtClean="0">
+                <a:latin typeface="Bahnschrift" panose="020B0502040204020203" pitchFamily="34" charset="0"/>
+              </a:rPr>
+              <a:t>16</a:t>
+            </a:fld>
+            <a:endParaRPr lang="fr-BE" sz="2000" dirty="0">
+              <a:latin typeface="Bahnschrift" panose="020B0502040204020203" pitchFamily="34" charset="0"/>
+            </a:endParaRPr>
+          </a:p>
+        </p:txBody>
+      </p:sp>
+    </p:spTree>
+    <p:extLst>
+      <p:ext uri="{BB962C8B-B14F-4D97-AF65-F5344CB8AC3E}">
+        <p14:creationId xmlns:p14="http://schemas.microsoft.com/office/powerpoint/2010/main" val="2727755465"/>
       </p:ext>
     </p:extLst>
   </p:cSld>
@@ -4603,6 +6235,44 @@
           </a:p>
         </p:txBody>
       </p:sp>
+      <p:sp>
+        <p:nvSpPr>
+          <p:cNvPr id="7" name="Espace réservé du numéro de diapositive 6">
+            <a:extLst>
+              <a:ext uri="{FF2B5EF4-FFF2-40B4-BE49-F238E27FC236}">
+                <a16:creationId xmlns:a16="http://schemas.microsoft.com/office/drawing/2014/main" id="{9AB028BB-D6F8-F82F-82BF-B2CC7A562848}"/>
+              </a:ext>
+            </a:extLst>
+          </p:cNvPr>
+          <p:cNvSpPr>
+            <a:spLocks noGrp="1"/>
+          </p:cNvSpPr>
+          <p:nvPr>
+            <p:ph type="sldNum" sz="quarter" idx="12"/>
+          </p:nvPr>
+        </p:nvSpPr>
+        <p:spPr>
+          <a:xfrm>
+            <a:off x="8610600" y="6356350"/>
+            <a:ext cx="2743200" cy="365125"/>
+          </a:xfrm>
+        </p:spPr>
+        <p:txBody>
+          <a:bodyPr/>
+          <a:lstStyle/>
+          <a:p>
+            <a:fld id="{187BEF47-448A-4600-B2F3-29BC55E386D0}" type="slidenum">
+              <a:rPr lang="fr-BE" sz="2000" smtClean="0">
+                <a:latin typeface="Bahnschrift" panose="020B0502040204020203" pitchFamily="34" charset="0"/>
+              </a:rPr>
+              <a:t>2</a:t>
+            </a:fld>
+            <a:endParaRPr lang="fr-BE" sz="2000" dirty="0">
+              <a:latin typeface="Bahnschrift" panose="020B0502040204020203" pitchFamily="34" charset="0"/>
+            </a:endParaRPr>
+          </a:p>
+        </p:txBody>
+      </p:sp>
     </p:spTree>
     <p:extLst>
       <p:ext uri="{BB962C8B-B14F-4D97-AF65-F5344CB8AC3E}">
@@ -4613,179 +6283,6 @@
   <p:clrMapOvr>
     <a:masterClrMapping/>
   </p:clrMapOvr>
-  <p:timing>
-    <p:tnLst>
-      <p:par>
-        <p:cTn id="1" dur="indefinite" restart="never" nodeType="tmRoot">
-          <p:childTnLst>
-            <p:seq concurrent="1" nextAc="seek">
-              <p:cTn id="2" dur="indefinite" nodeType="mainSeq">
-                <p:childTnLst>
-                  <p:par>
-                    <p:cTn id="3" fill="hold">
-                      <p:stCondLst>
-                        <p:cond delay="indefinite"/>
-                      </p:stCondLst>
-                      <p:childTnLst>
-                        <p:par>
-                          <p:cTn id="4" fill="hold">
-                            <p:stCondLst>
-                              <p:cond delay="0"/>
-                            </p:stCondLst>
-                            <p:childTnLst>
-                              <p:par>
-                                <p:cTn id="5" presetID="1" presetClass="entr" presetSubtype="0" fill="hold" grpId="0" nodeType="clickEffect">
-                                  <p:stCondLst>
-                                    <p:cond delay="0"/>
-                                  </p:stCondLst>
-                                  <p:childTnLst>
-                                    <p:set>
-                                      <p:cBhvr>
-                                        <p:cTn id="6" dur="1" fill="hold">
-                                          <p:stCondLst>
-                                            <p:cond delay="0"/>
-                                          </p:stCondLst>
-                                        </p:cTn>
-                                        <p:tgtEl>
-                                          <p:spTgt spid="4"/>
-                                        </p:tgtEl>
-                                        <p:attrNameLst>
-                                          <p:attrName>style.visibility</p:attrName>
-                                        </p:attrNameLst>
-                                      </p:cBhvr>
-                                      <p:to>
-                                        <p:strVal val="visible"/>
-                                      </p:to>
-                                    </p:set>
-                                  </p:childTnLst>
-                                </p:cTn>
-                              </p:par>
-                            </p:childTnLst>
-                          </p:cTn>
-                        </p:par>
-                      </p:childTnLst>
-                    </p:cTn>
-                  </p:par>
-                  <p:par>
-                    <p:cTn id="7" fill="hold">
-                      <p:stCondLst>
-                        <p:cond delay="indefinite"/>
-                      </p:stCondLst>
-                      <p:childTnLst>
-                        <p:par>
-                          <p:cTn id="8" fill="hold">
-                            <p:stCondLst>
-                              <p:cond delay="0"/>
-                            </p:stCondLst>
-                            <p:childTnLst>
-                              <p:par>
-                                <p:cTn id="9" presetID="1" presetClass="entr" presetSubtype="0" fill="hold" nodeType="clickEffect">
-                                  <p:stCondLst>
-                                    <p:cond delay="0"/>
-                                  </p:stCondLst>
-                                  <p:childTnLst>
-                                    <p:set>
-                                      <p:cBhvr>
-                                        <p:cTn id="10" dur="1" fill="hold">
-                                          <p:stCondLst>
-                                            <p:cond delay="0"/>
-                                          </p:stCondLst>
-                                        </p:cTn>
-                                        <p:tgtEl>
-                                          <p:spTgt spid="5">
-                                            <p:txEl>
-                                              <p:pRg st="0" end="0"/>
-                                            </p:txEl>
-                                          </p:spTgt>
-                                        </p:tgtEl>
-                                        <p:attrNameLst>
-                                          <p:attrName>style.visibility</p:attrName>
-                                        </p:attrNameLst>
-                                      </p:cBhvr>
-                                      <p:to>
-                                        <p:strVal val="visible"/>
-                                      </p:to>
-                                    </p:set>
-                                  </p:childTnLst>
-                                </p:cTn>
-                              </p:par>
-                            </p:childTnLst>
-                          </p:cTn>
-                        </p:par>
-                      </p:childTnLst>
-                    </p:cTn>
-                  </p:par>
-                  <p:par>
-                    <p:cTn id="11" fill="hold">
-                      <p:stCondLst>
-                        <p:cond delay="indefinite"/>
-                      </p:stCondLst>
-                      <p:childTnLst>
-                        <p:par>
-                          <p:cTn id="12" fill="hold">
-                            <p:stCondLst>
-                              <p:cond delay="0"/>
-                            </p:stCondLst>
-                            <p:childTnLst>
-                              <p:par>
-                                <p:cTn id="13" presetID="1" presetClass="entr" presetSubtype="0" fill="hold" grpId="0" nodeType="clickEffect">
-                                  <p:stCondLst>
-                                    <p:cond delay="0"/>
-                                  </p:stCondLst>
-                                  <p:childTnLst>
-                                    <p:set>
-                                      <p:cBhvr>
-                                        <p:cTn id="14" dur="1" fill="hold">
-                                          <p:stCondLst>
-                                            <p:cond delay="0"/>
-                                          </p:stCondLst>
-                                        </p:cTn>
-                                        <p:tgtEl>
-                                          <p:spTgt spid="6"/>
-                                        </p:tgtEl>
-                                        <p:attrNameLst>
-                                          <p:attrName>style.visibility</p:attrName>
-                                        </p:attrNameLst>
-                                      </p:cBhvr>
-                                      <p:to>
-                                        <p:strVal val="visible"/>
-                                      </p:to>
-                                    </p:set>
-                                  </p:childTnLst>
-                                </p:cTn>
-                              </p:par>
-                            </p:childTnLst>
-                          </p:cTn>
-                        </p:par>
-                      </p:childTnLst>
-                    </p:cTn>
-                  </p:par>
-                </p:childTnLst>
-              </p:cTn>
-              <p:prevCondLst>
-                <p:cond evt="onPrev" delay="0">
-                  <p:tgtEl>
-                    <p:sldTgt/>
-                  </p:tgtEl>
-                </p:cond>
-              </p:prevCondLst>
-              <p:nextCondLst>
-                <p:cond evt="onNext" delay="0">
-                  <p:tgtEl>
-                    <p:sldTgt/>
-                  </p:tgtEl>
-                </p:cond>
-              </p:nextCondLst>
-            </p:seq>
-          </p:childTnLst>
-        </p:cTn>
-      </p:par>
-    </p:tnLst>
-    <p:bldLst>
-      <p:bldP spid="4" grpId="0"/>
-      <p:bldP spid="6" grpId="0"/>
-    </p:bldLst>
-  </p:timing>
 </p:sld>
 </file>
 
@@ -5108,6 +6605,44 @@
               </a:rPr>
               <a:t>,  mis en ligne entre août 2018 et août 2022, consulté en septembre 2022</a:t>
             </a:r>
+          </a:p>
+        </p:txBody>
+      </p:sp>
+      <p:sp>
+        <p:nvSpPr>
+          <p:cNvPr id="4" name="Espace réservé du numéro de diapositive 6">
+            <a:extLst>
+              <a:ext uri="{FF2B5EF4-FFF2-40B4-BE49-F238E27FC236}">
+                <a16:creationId xmlns:a16="http://schemas.microsoft.com/office/drawing/2014/main" id="{65F9579F-8859-A0E5-D8E0-F42E493EB0CC}"/>
+              </a:ext>
+            </a:extLst>
+          </p:cNvPr>
+          <p:cNvSpPr>
+            <a:spLocks noGrp="1"/>
+          </p:cNvSpPr>
+          <p:nvPr>
+            <p:ph type="sldNum" sz="quarter" idx="12"/>
+          </p:nvPr>
+        </p:nvSpPr>
+        <p:spPr>
+          <a:xfrm>
+            <a:off x="8610600" y="6356350"/>
+            <a:ext cx="2743200" cy="365125"/>
+          </a:xfrm>
+        </p:spPr>
+        <p:txBody>
+          <a:bodyPr/>
+          <a:lstStyle/>
+          <a:p>
+            <a:fld id="{187BEF47-448A-4600-B2F3-29BC55E386D0}" type="slidenum">
+              <a:rPr lang="fr-BE" sz="2000" smtClean="0">
+                <a:latin typeface="Bahnschrift" panose="020B0502040204020203" pitchFamily="34" charset="0"/>
+              </a:rPr>
+              <a:t>3</a:t>
+            </a:fld>
+            <a:endParaRPr lang="fr-BE" sz="2000" dirty="0">
+              <a:latin typeface="Bahnschrift" panose="020B0502040204020203" pitchFamily="34" charset="0"/>
+            </a:endParaRPr>
           </a:p>
         </p:txBody>
       </p:sp>
@@ -5433,6 +6968,44 @@
           </a:p>
         </p:txBody>
       </p:sp>
+      <p:sp>
+        <p:nvSpPr>
+          <p:cNvPr id="3" name="Espace réservé du numéro de diapositive 6">
+            <a:extLst>
+              <a:ext uri="{FF2B5EF4-FFF2-40B4-BE49-F238E27FC236}">
+                <a16:creationId xmlns:a16="http://schemas.microsoft.com/office/drawing/2014/main" id="{7ED71862-1023-1D6E-C11F-EBEC77256802}"/>
+              </a:ext>
+            </a:extLst>
+          </p:cNvPr>
+          <p:cNvSpPr>
+            <a:spLocks noGrp="1"/>
+          </p:cNvSpPr>
+          <p:nvPr>
+            <p:ph type="sldNum" sz="quarter" idx="12"/>
+          </p:nvPr>
+        </p:nvSpPr>
+        <p:spPr>
+          <a:xfrm>
+            <a:off x="8610600" y="6356350"/>
+            <a:ext cx="2743200" cy="365125"/>
+          </a:xfrm>
+        </p:spPr>
+        <p:txBody>
+          <a:bodyPr/>
+          <a:lstStyle/>
+          <a:p>
+            <a:fld id="{187BEF47-448A-4600-B2F3-29BC55E386D0}" type="slidenum">
+              <a:rPr lang="fr-BE" sz="2000" smtClean="0">
+                <a:latin typeface="Bahnschrift" panose="020B0502040204020203" pitchFamily="34" charset="0"/>
+              </a:rPr>
+              <a:t>4</a:t>
+            </a:fld>
+            <a:endParaRPr lang="fr-BE" sz="2000" dirty="0">
+              <a:latin typeface="Bahnschrift" panose="020B0502040204020203" pitchFamily="34" charset="0"/>
+            </a:endParaRPr>
+          </a:p>
+        </p:txBody>
+      </p:sp>
     </p:spTree>
     <p:extLst>
       <p:ext uri="{BB962C8B-B14F-4D97-AF65-F5344CB8AC3E}">
@@ -5729,6 +7302,44 @@
           </a:p>
         </p:txBody>
       </p:sp>
+      <p:sp>
+        <p:nvSpPr>
+          <p:cNvPr id="5" name="Espace réservé du numéro de diapositive 6">
+            <a:extLst>
+              <a:ext uri="{FF2B5EF4-FFF2-40B4-BE49-F238E27FC236}">
+                <a16:creationId xmlns:a16="http://schemas.microsoft.com/office/drawing/2014/main" id="{67E63F30-B989-980A-5042-C285041D52C0}"/>
+              </a:ext>
+            </a:extLst>
+          </p:cNvPr>
+          <p:cNvSpPr>
+            <a:spLocks noGrp="1"/>
+          </p:cNvSpPr>
+          <p:nvPr>
+            <p:ph type="sldNum" sz="quarter" idx="12"/>
+          </p:nvPr>
+        </p:nvSpPr>
+        <p:spPr>
+          <a:xfrm>
+            <a:off x="8610600" y="6356350"/>
+            <a:ext cx="2743200" cy="365125"/>
+          </a:xfrm>
+        </p:spPr>
+        <p:txBody>
+          <a:bodyPr/>
+          <a:lstStyle/>
+          <a:p>
+            <a:fld id="{187BEF47-448A-4600-B2F3-29BC55E386D0}" type="slidenum">
+              <a:rPr lang="fr-BE" sz="2000" smtClean="0">
+                <a:latin typeface="Bahnschrift" panose="020B0502040204020203" pitchFamily="34" charset="0"/>
+              </a:rPr>
+              <a:t>5</a:t>
+            </a:fld>
+            <a:endParaRPr lang="fr-BE" sz="2000" dirty="0">
+              <a:latin typeface="Bahnschrift" panose="020B0502040204020203" pitchFamily="34" charset="0"/>
+            </a:endParaRPr>
+          </a:p>
+        </p:txBody>
+      </p:sp>
     </p:spTree>
     <p:extLst>
       <p:ext uri="{BB962C8B-B14F-4D97-AF65-F5344CB8AC3E}">
@@ -5891,6 +7502,44 @@
           </a:p>
         </p:txBody>
       </p:sp>
+      <p:sp>
+        <p:nvSpPr>
+          <p:cNvPr id="3" name="Espace réservé du numéro de diapositive 6">
+            <a:extLst>
+              <a:ext uri="{FF2B5EF4-FFF2-40B4-BE49-F238E27FC236}">
+                <a16:creationId xmlns:a16="http://schemas.microsoft.com/office/drawing/2014/main" id="{07EB2416-2A65-7F92-37AA-59B91235C21A}"/>
+              </a:ext>
+            </a:extLst>
+          </p:cNvPr>
+          <p:cNvSpPr>
+            <a:spLocks noGrp="1"/>
+          </p:cNvSpPr>
+          <p:nvPr>
+            <p:ph type="sldNum" sz="quarter" idx="12"/>
+          </p:nvPr>
+        </p:nvSpPr>
+        <p:spPr>
+          <a:xfrm>
+            <a:off x="8610600" y="6356350"/>
+            <a:ext cx="2743200" cy="365125"/>
+          </a:xfrm>
+        </p:spPr>
+        <p:txBody>
+          <a:bodyPr/>
+          <a:lstStyle/>
+          <a:p>
+            <a:fld id="{187BEF47-448A-4600-B2F3-29BC55E386D0}" type="slidenum">
+              <a:rPr lang="fr-BE" sz="2000" smtClean="0">
+                <a:latin typeface="Bahnschrift" panose="020B0502040204020203" pitchFamily="34" charset="0"/>
+              </a:rPr>
+              <a:t>6</a:t>
+            </a:fld>
+            <a:endParaRPr lang="fr-BE" sz="2000" dirty="0">
+              <a:latin typeface="Bahnschrift" panose="020B0502040204020203" pitchFamily="34" charset="0"/>
+            </a:endParaRPr>
+          </a:p>
+        </p:txBody>
+      </p:sp>
     </p:spTree>
     <p:extLst>
       <p:ext uri="{BB962C8B-B14F-4D97-AF65-F5344CB8AC3E}">
@@ -6290,6 +7939,44 @@
           </a:p>
         </p:txBody>
       </p:sp>
+      <p:sp>
+        <p:nvSpPr>
+          <p:cNvPr id="4" name="Espace réservé du numéro de diapositive 6">
+            <a:extLst>
+              <a:ext uri="{FF2B5EF4-FFF2-40B4-BE49-F238E27FC236}">
+                <a16:creationId xmlns:a16="http://schemas.microsoft.com/office/drawing/2014/main" id="{084F65CF-47AA-EC26-A55F-FAAD5FF952A8}"/>
+              </a:ext>
+            </a:extLst>
+          </p:cNvPr>
+          <p:cNvSpPr>
+            <a:spLocks noGrp="1"/>
+          </p:cNvSpPr>
+          <p:nvPr>
+            <p:ph type="sldNum" sz="quarter" idx="12"/>
+          </p:nvPr>
+        </p:nvSpPr>
+        <p:spPr>
+          <a:xfrm>
+            <a:off x="8610600" y="6356350"/>
+            <a:ext cx="2743200" cy="365125"/>
+          </a:xfrm>
+        </p:spPr>
+        <p:txBody>
+          <a:bodyPr/>
+          <a:lstStyle/>
+          <a:p>
+            <a:fld id="{187BEF47-448A-4600-B2F3-29BC55E386D0}" type="slidenum">
+              <a:rPr lang="fr-BE" sz="2000" smtClean="0">
+                <a:latin typeface="Bahnschrift" panose="020B0502040204020203" pitchFamily="34" charset="0"/>
+              </a:rPr>
+              <a:t>7</a:t>
+            </a:fld>
+            <a:endParaRPr lang="fr-BE" sz="2000" dirty="0">
+              <a:latin typeface="Bahnschrift" panose="020B0502040204020203" pitchFamily="34" charset="0"/>
+            </a:endParaRPr>
+          </a:p>
+        </p:txBody>
+      </p:sp>
     </p:spTree>
     <p:extLst>
       <p:ext uri="{BB962C8B-B14F-4D97-AF65-F5344CB8AC3E}">
@@ -6584,6 +8271,44 @@
           </a:p>
         </p:txBody>
       </p:sp>
+      <p:sp>
+        <p:nvSpPr>
+          <p:cNvPr id="7" name="Espace réservé du numéro de diapositive 6">
+            <a:extLst>
+              <a:ext uri="{FF2B5EF4-FFF2-40B4-BE49-F238E27FC236}">
+                <a16:creationId xmlns:a16="http://schemas.microsoft.com/office/drawing/2014/main" id="{4D343BFC-AAAE-D497-94EE-487B9A498DAC}"/>
+              </a:ext>
+            </a:extLst>
+          </p:cNvPr>
+          <p:cNvSpPr>
+            <a:spLocks noGrp="1"/>
+          </p:cNvSpPr>
+          <p:nvPr>
+            <p:ph type="sldNum" sz="quarter" idx="12"/>
+          </p:nvPr>
+        </p:nvSpPr>
+        <p:spPr>
+          <a:xfrm>
+            <a:off x="8610600" y="6356350"/>
+            <a:ext cx="2743200" cy="365125"/>
+          </a:xfrm>
+        </p:spPr>
+        <p:txBody>
+          <a:bodyPr/>
+          <a:lstStyle/>
+          <a:p>
+            <a:fld id="{187BEF47-448A-4600-B2F3-29BC55E386D0}" type="slidenum">
+              <a:rPr lang="fr-BE" sz="2000" smtClean="0">
+                <a:latin typeface="Bahnschrift" panose="020B0502040204020203" pitchFamily="34" charset="0"/>
+              </a:rPr>
+              <a:t>8</a:t>
+            </a:fld>
+            <a:endParaRPr lang="fr-BE" sz="2000" dirty="0">
+              <a:latin typeface="Bahnschrift" panose="020B0502040204020203" pitchFamily="34" charset="0"/>
+            </a:endParaRPr>
+          </a:p>
+        </p:txBody>
+      </p:sp>
     </p:spTree>
     <p:extLst>
       <p:ext uri="{BB962C8B-B14F-4D97-AF65-F5344CB8AC3E}">
@@ -6790,6 +8515,44 @@
               </a:rPr>
               <a:t>DTI – NODDI – DIAMOND – MF : Avantages et limitations</a:t>
             </a:r>
+          </a:p>
+        </p:txBody>
+      </p:sp>
+      <p:sp>
+        <p:nvSpPr>
+          <p:cNvPr id="6" name="Espace réservé du numéro de diapositive 6">
+            <a:extLst>
+              <a:ext uri="{FF2B5EF4-FFF2-40B4-BE49-F238E27FC236}">
+                <a16:creationId xmlns:a16="http://schemas.microsoft.com/office/drawing/2014/main" id="{021133DE-5681-343C-B6B7-2611871B8385}"/>
+              </a:ext>
+            </a:extLst>
+          </p:cNvPr>
+          <p:cNvSpPr>
+            <a:spLocks noGrp="1"/>
+          </p:cNvSpPr>
+          <p:nvPr>
+            <p:ph type="sldNum" sz="quarter" idx="12"/>
+          </p:nvPr>
+        </p:nvSpPr>
+        <p:spPr>
+          <a:xfrm>
+            <a:off x="8610600" y="6356350"/>
+            <a:ext cx="2743200" cy="365125"/>
+          </a:xfrm>
+        </p:spPr>
+        <p:txBody>
+          <a:bodyPr/>
+          <a:lstStyle/>
+          <a:p>
+            <a:fld id="{187BEF47-448A-4600-B2F3-29BC55E386D0}" type="slidenum">
+              <a:rPr lang="fr-BE" sz="2000" smtClean="0">
+                <a:latin typeface="Bahnschrift" panose="020B0502040204020203" pitchFamily="34" charset="0"/>
+              </a:rPr>
+              <a:t>9</a:t>
+            </a:fld>
+            <a:endParaRPr lang="fr-BE" sz="2000" dirty="0">
+              <a:latin typeface="Bahnschrift" panose="020B0502040204020203" pitchFamily="34" charset="0"/>
+            </a:endParaRPr>
           </a:p>
         </p:txBody>
       </p:sp>
@@ -7099,4 +8862,299 @@
     </a:ext>
   </a:extLst>
 </a:theme>
+</file>
+
+<file path=ppt/theme/theme2.xml><?xml version="1.0" encoding="utf-8"?>
+<a:theme xmlns:a="http://schemas.openxmlformats.org/drawingml/2006/main" name="Thème Office">
+  <a:themeElements>
+    <a:clrScheme name="Office">
+      <a:dk1>
+        <a:sysClr val="windowText" lastClr="000000"/>
+      </a:dk1>
+      <a:lt1>
+        <a:sysClr val="window" lastClr="FFFFFF"/>
+      </a:lt1>
+      <a:dk2>
+        <a:srgbClr val="44546A"/>
+      </a:dk2>
+      <a:lt2>
+        <a:srgbClr val="E7E6E6"/>
+      </a:lt2>
+      <a:accent1>
+        <a:srgbClr val="4472C4"/>
+      </a:accent1>
+      <a:accent2>
+        <a:srgbClr val="ED7D31"/>
+      </a:accent2>
+      <a:accent3>
+        <a:srgbClr val="A5A5A5"/>
+      </a:accent3>
+      <a:accent4>
+        <a:srgbClr val="FFC000"/>
+      </a:accent4>
+      <a:accent5>
+        <a:srgbClr val="5B9BD5"/>
+      </a:accent5>
+      <a:accent6>
+        <a:srgbClr val="70AD47"/>
+      </a:accent6>
+      <a:hlink>
+        <a:srgbClr val="0563C1"/>
+      </a:hlink>
+      <a:folHlink>
+        <a:srgbClr val="954F72"/>
+      </a:folHlink>
+    </a:clrScheme>
+    <a:fontScheme name="Office">
+      <a:majorFont>
+        <a:latin typeface="Calibri Light" panose="020F0302020204030204"/>
+        <a:ea typeface=""/>
+        <a:cs typeface=""/>
+        <a:font script="Jpan" typeface="游ゴシック Light"/>
+        <a:font script="Hang" typeface="맑은 고딕"/>
+        <a:font script="Hans" typeface="等线 Light"/>
+        <a:font script="Hant" typeface="新細明體"/>
+        <a:font script="Arab" typeface="Times New Roman"/>
+        <a:font script="Hebr" typeface="Times New Roman"/>
+        <a:font script="Thai" typeface="Angsana New"/>
+        <a:font script="Ethi" typeface="Nyala"/>
+        <a:font script="Beng" typeface="Vrinda"/>
+        <a:font script="Gujr" typeface="Shruti"/>
+        <a:font script="Khmr" typeface="MoolBoran"/>
+        <a:font script="Knda" typeface="Tunga"/>
+        <a:font script="Guru" typeface="Raavi"/>
+        <a:font script="Cans" typeface="Euphemia"/>
+        <a:font script="Cher" typeface="Plantagenet Cherokee"/>
+        <a:font script="Yiii" typeface="Microsoft Yi Baiti"/>
+        <a:font script="Tibt" typeface="Microsoft Himalaya"/>
+        <a:font script="Thaa" typeface="MV Boli"/>
+        <a:font script="Deva" typeface="Mangal"/>
+        <a:font script="Telu" typeface="Gautami"/>
+        <a:font script="Taml" typeface="Latha"/>
+        <a:font script="Syrc" typeface="Estrangelo Edessa"/>
+        <a:font script="Orya" typeface="Kalinga"/>
+        <a:font script="Mlym" typeface="Kartika"/>
+        <a:font script="Laoo" typeface="DokChampa"/>
+        <a:font script="Sinh" typeface="Iskoola Pota"/>
+        <a:font script="Mong" typeface="Mongolian Baiti"/>
+        <a:font script="Viet" typeface="Times New Roman"/>
+        <a:font script="Uigh" typeface="Microsoft Uighur"/>
+        <a:font script="Geor" typeface="Sylfaen"/>
+        <a:font script="Armn" typeface="Arial"/>
+        <a:font script="Bugi" typeface="Leelawadee UI"/>
+        <a:font script="Bopo" typeface="Microsoft JhengHei"/>
+        <a:font script="Java" typeface="Javanese Text"/>
+        <a:font script="Lisu" typeface="Segoe UI"/>
+        <a:font script="Mymr" typeface="Myanmar Text"/>
+        <a:font script="Nkoo" typeface="Ebrima"/>
+        <a:font script="Olck" typeface="Nirmala UI"/>
+        <a:font script="Osma" typeface="Ebrima"/>
+        <a:font script="Phag" typeface="Phagspa"/>
+        <a:font script="Syrn" typeface="Estrangelo Edessa"/>
+        <a:font script="Syrj" typeface="Estrangelo Edessa"/>
+        <a:font script="Syre" typeface="Estrangelo Edessa"/>
+        <a:font script="Sora" typeface="Nirmala UI"/>
+        <a:font script="Tale" typeface="Microsoft Tai Le"/>
+        <a:font script="Talu" typeface="Microsoft New Tai Lue"/>
+        <a:font script="Tfng" typeface="Ebrima"/>
+      </a:majorFont>
+      <a:minorFont>
+        <a:latin typeface="Calibri" panose="020F0502020204030204"/>
+        <a:ea typeface=""/>
+        <a:cs typeface=""/>
+        <a:font script="Jpan" typeface="游ゴシック"/>
+        <a:font script="Hang" typeface="맑은 고딕"/>
+        <a:font script="Hans" typeface="等线"/>
+        <a:font script="Hant" typeface="新細明體"/>
+        <a:font script="Arab" typeface="Arial"/>
+        <a:font script="Hebr" typeface="Arial"/>
+        <a:font script="Thai" typeface="Cordia New"/>
+        <a:font script="Ethi" typeface="Nyala"/>
+        <a:font script="Beng" typeface="Vrinda"/>
+        <a:font script="Gujr" typeface="Shruti"/>
+        <a:font script="Khmr" typeface="DaunPenh"/>
+        <a:font script="Knda" typeface="Tunga"/>
+        <a:font script="Guru" typeface="Raavi"/>
+        <a:font script="Cans" typeface="Euphemia"/>
+        <a:font script="Cher" typeface="Plantagenet Cherokee"/>
+        <a:font script="Yiii" typeface="Microsoft Yi Baiti"/>
+        <a:font script="Tibt" typeface="Microsoft Himalaya"/>
+        <a:font script="Thaa" typeface="MV Boli"/>
+        <a:font script="Deva" typeface="Mangal"/>
+        <a:font script="Telu" typeface="Gautami"/>
+        <a:font script="Taml" typeface="Latha"/>
+        <a:font script="Syrc" typeface="Estrangelo Edessa"/>
+        <a:font script="Orya" typeface="Kalinga"/>
+        <a:font script="Mlym" typeface="Kartika"/>
+        <a:font script="Laoo" typeface="DokChampa"/>
+        <a:font script="Sinh" typeface="Iskoola Pota"/>
+        <a:font script="Mong" typeface="Mongolian Baiti"/>
+        <a:font script="Viet" typeface="Arial"/>
+        <a:font script="Uigh" typeface="Microsoft Uighur"/>
+        <a:font script="Geor" typeface="Sylfaen"/>
+        <a:font script="Armn" typeface="Arial"/>
+        <a:font script="Bugi" typeface="Leelawadee UI"/>
+        <a:font script="Bopo" typeface="Microsoft JhengHei"/>
+        <a:font script="Java" typeface="Javanese Text"/>
+        <a:font script="Lisu" typeface="Segoe UI"/>
+        <a:font script="Mymr" typeface="Myanmar Text"/>
+        <a:font script="Nkoo" typeface="Ebrima"/>
+        <a:font script="Olck" typeface="Nirmala UI"/>
+        <a:font script="Osma" typeface="Ebrima"/>
+        <a:font script="Phag" typeface="Phagspa"/>
+        <a:font script="Syrn" typeface="Estrangelo Edessa"/>
+        <a:font script="Syrj" typeface="Estrangelo Edessa"/>
+        <a:font script="Syre" typeface="Estrangelo Edessa"/>
+        <a:font script="Sora" typeface="Nirmala UI"/>
+        <a:font script="Tale" typeface="Microsoft Tai Le"/>
+        <a:font script="Talu" typeface="Microsoft New Tai Lue"/>
+        <a:font script="Tfng" typeface="Ebrima"/>
+      </a:minorFont>
+    </a:fontScheme>
+    <a:fmtScheme name="Office">
+      <a:fillStyleLst>
+        <a:solidFill>
+          <a:schemeClr val="phClr"/>
+        </a:solidFill>
+        <a:gradFill rotWithShape="1">
+          <a:gsLst>
+            <a:gs pos="0">
+              <a:schemeClr val="phClr">
+                <a:lumMod val="110000"/>
+                <a:satMod val="105000"/>
+                <a:tint val="67000"/>
+              </a:schemeClr>
+            </a:gs>
+            <a:gs pos="50000">
+              <a:schemeClr val="phClr">
+                <a:lumMod val="105000"/>
+                <a:satMod val="103000"/>
+                <a:tint val="73000"/>
+              </a:schemeClr>
+            </a:gs>
+            <a:gs pos="100000">
+              <a:schemeClr val="phClr">
+                <a:lumMod val="105000"/>
+                <a:satMod val="109000"/>
+                <a:tint val="81000"/>
+              </a:schemeClr>
+            </a:gs>
+          </a:gsLst>
+          <a:lin ang="5400000" scaled="0"/>
+        </a:gradFill>
+        <a:gradFill rotWithShape="1">
+          <a:gsLst>
+            <a:gs pos="0">
+              <a:schemeClr val="phClr">
+                <a:satMod val="103000"/>
+                <a:lumMod val="102000"/>
+                <a:tint val="94000"/>
+              </a:schemeClr>
+            </a:gs>
+            <a:gs pos="50000">
+              <a:schemeClr val="phClr">
+                <a:satMod val="110000"/>
+                <a:lumMod val="100000"/>
+                <a:shade val="100000"/>
+              </a:schemeClr>
+            </a:gs>
+            <a:gs pos="100000">
+              <a:schemeClr val="phClr">
+                <a:lumMod val="99000"/>
+                <a:satMod val="120000"/>
+                <a:shade val="78000"/>
+              </a:schemeClr>
+            </a:gs>
+          </a:gsLst>
+          <a:lin ang="5400000" scaled="0"/>
+        </a:gradFill>
+      </a:fillStyleLst>
+      <a:lnStyleLst>
+        <a:ln w="6350" cap="flat" cmpd="sng" algn="ctr">
+          <a:solidFill>
+            <a:schemeClr val="phClr"/>
+          </a:solidFill>
+          <a:prstDash val="solid"/>
+          <a:miter lim="800000"/>
+        </a:ln>
+        <a:ln w="12700" cap="flat" cmpd="sng" algn="ctr">
+          <a:solidFill>
+            <a:schemeClr val="phClr"/>
+          </a:solidFill>
+          <a:prstDash val="solid"/>
+          <a:miter lim="800000"/>
+        </a:ln>
+        <a:ln w="19050" cap="flat" cmpd="sng" algn="ctr">
+          <a:solidFill>
+            <a:schemeClr val="phClr"/>
+          </a:solidFill>
+          <a:prstDash val="solid"/>
+          <a:miter lim="800000"/>
+        </a:ln>
+      </a:lnStyleLst>
+      <a:effectStyleLst>
+        <a:effectStyle>
+          <a:effectLst/>
+        </a:effectStyle>
+        <a:effectStyle>
+          <a:effectLst/>
+        </a:effectStyle>
+        <a:effectStyle>
+          <a:effectLst>
+            <a:outerShdw blurRad="57150" dist="19050" dir="5400000" algn="ctr" rotWithShape="0">
+              <a:srgbClr val="000000">
+                <a:alpha val="63000"/>
+              </a:srgbClr>
+            </a:outerShdw>
+          </a:effectLst>
+        </a:effectStyle>
+      </a:effectStyleLst>
+      <a:bgFillStyleLst>
+        <a:solidFill>
+          <a:schemeClr val="phClr"/>
+        </a:solidFill>
+        <a:solidFill>
+          <a:schemeClr val="phClr">
+            <a:tint val="95000"/>
+            <a:satMod val="170000"/>
+          </a:schemeClr>
+        </a:solidFill>
+        <a:gradFill rotWithShape="1">
+          <a:gsLst>
+            <a:gs pos="0">
+              <a:schemeClr val="phClr">
+                <a:tint val="93000"/>
+                <a:satMod val="150000"/>
+                <a:shade val="98000"/>
+                <a:lumMod val="102000"/>
+              </a:schemeClr>
+            </a:gs>
+            <a:gs pos="50000">
+              <a:schemeClr val="phClr">
+                <a:tint val="98000"/>
+                <a:satMod val="130000"/>
+                <a:shade val="90000"/>
+                <a:lumMod val="103000"/>
+              </a:schemeClr>
+            </a:gs>
+            <a:gs pos="100000">
+              <a:schemeClr val="phClr">
+                <a:shade val="63000"/>
+                <a:satMod val="120000"/>
+              </a:schemeClr>
+            </a:gs>
+          </a:gsLst>
+          <a:lin ang="5400000" scaled="0"/>
+        </a:gradFill>
+      </a:bgFillStyleLst>
+    </a:fmtScheme>
+  </a:themeElements>
+  <a:objectDefaults/>
+  <a:extraClrSchemeLst/>
+  <a:extLst>
+    <a:ext uri="{05A4C25C-085E-4340-85A3-A5531E510DB2}">
+      <thm15:themeFamily xmlns:thm15="http://schemas.microsoft.com/office/thememl/2012/main" name="Office Theme" id="{62F939B6-93AF-4DB8-9C6B-D6C7DFDC589F}" vid="{4A3C46E8-61CC-4603-A589-7422A47A8E4A}"/>
+    </a:ext>
+  </a:extLst>
+</a:theme>
 </file>
</xml_diff>